<commit_message>
Final versions from Scoped 2024 workshop
</commit_message>
<xml_diff>
--- a/SCOPED_2024/MsPASS_Overview.pptx
+++ b/SCOPED_2024/MsPASS_Overview.pptx
@@ -5,31 +5,30 @@
     <p:sldMasterId id="2147483660" r:id="rId1"/>
   </p:sldMasterIdLst>
   <p:notesMasterIdLst>
-    <p:notesMasterId r:id="rId24"/>
+    <p:notesMasterId r:id="rId23"/>
   </p:notesMasterIdLst>
   <p:sldIdLst>
     <p:sldId id="257" r:id="rId2"/>
     <p:sldId id="299" r:id="rId3"/>
     <p:sldId id="258" r:id="rId4"/>
-    <p:sldId id="284" r:id="rId5"/>
-    <p:sldId id="425" r:id="rId6"/>
-    <p:sldId id="300" r:id="rId7"/>
-    <p:sldId id="426" r:id="rId8"/>
-    <p:sldId id="298" r:id="rId9"/>
-    <p:sldId id="427" r:id="rId10"/>
-    <p:sldId id="264" r:id="rId11"/>
-    <p:sldId id="301" r:id="rId12"/>
-    <p:sldId id="296" r:id="rId13"/>
-    <p:sldId id="302" r:id="rId14"/>
-    <p:sldId id="303" r:id="rId15"/>
-    <p:sldId id="304" r:id="rId16"/>
-    <p:sldId id="306" r:id="rId17"/>
-    <p:sldId id="275" r:id="rId18"/>
-    <p:sldId id="265" r:id="rId19"/>
-    <p:sldId id="424" r:id="rId20"/>
-    <p:sldId id="266" r:id="rId21"/>
-    <p:sldId id="271" r:id="rId22"/>
-    <p:sldId id="277" r:id="rId23"/>
+    <p:sldId id="301" r:id="rId5"/>
+    <p:sldId id="296" r:id="rId6"/>
+    <p:sldId id="302" r:id="rId7"/>
+    <p:sldId id="425" r:id="rId8"/>
+    <p:sldId id="284" r:id="rId9"/>
+    <p:sldId id="300" r:id="rId10"/>
+    <p:sldId id="426" r:id="rId11"/>
+    <p:sldId id="427" r:id="rId12"/>
+    <p:sldId id="264" r:id="rId13"/>
+    <p:sldId id="303" r:id="rId14"/>
+    <p:sldId id="304" r:id="rId15"/>
+    <p:sldId id="306" r:id="rId16"/>
+    <p:sldId id="275" r:id="rId17"/>
+    <p:sldId id="265" r:id="rId18"/>
+    <p:sldId id="424" r:id="rId19"/>
+    <p:sldId id="266" r:id="rId20"/>
+    <p:sldId id="271" r:id="rId21"/>
+    <p:sldId id="277" r:id="rId22"/>
   </p:sldIdLst>
   <p:sldSz cx="12192000" cy="6858000"/>
   <p:notesSz cx="6858000" cy="9144000"/>
@@ -218,7 +217,7 @@
           <a:p>
             <a:fld id="{FAC64F3B-5C24-7346-93FB-13EDB6EBB64D}" type="datetimeFigureOut">
               <a:rPr lang="en-US" smtClean="0"/>
-              <a:t>5/18/24</a:t>
+              <a:t>5/23/24</a:t>
             </a:fld>
             <a:endParaRPr lang="en-US"/>
           </a:p>
@@ -550,7 +549,7 @@
           <a:p>
             <a:fld id="{4DF126F6-DA57-DA4A-9775-21680B40218E}" type="slidenum">
               <a:rPr lang="en-US" smtClean="0"/>
-              <a:t>7</a:t>
+              <a:t>10</a:t>
             </a:fld>
             <a:endParaRPr lang="en-US"/>
           </a:p>
@@ -843,7 +842,7 @@
           <a:p>
             <a:fld id="{ED577EA4-891D-A246-93B2-3B44A5BC8805}" type="datetimeFigureOut">
               <a:rPr lang="en-US" smtClean="0"/>
-              <a:t>5/18/24</a:t>
+              <a:t>5/23/24</a:t>
             </a:fld>
             <a:endParaRPr lang="en-US"/>
           </a:p>
@@ -1257,7 +1256,7 @@
           <a:p>
             <a:fld id="{ED577EA4-891D-A246-93B2-3B44A5BC8805}" type="datetimeFigureOut">
               <a:rPr lang="en-US" smtClean="0"/>
-              <a:t>5/18/24</a:t>
+              <a:t>5/23/24</a:t>
             </a:fld>
             <a:endParaRPr lang="en-US"/>
           </a:p>
@@ -1593,7 +1592,7 @@
           <a:p>
             <a:fld id="{ED577EA4-891D-A246-93B2-3B44A5BC8805}" type="datetimeFigureOut">
               <a:rPr lang="en-US" smtClean="0"/>
-              <a:t>5/18/24</a:t>
+              <a:t>5/23/24</a:t>
             </a:fld>
             <a:endParaRPr lang="en-US"/>
           </a:p>
@@ -1998,7 +1997,7 @@
           <a:p>
             <a:fld id="{ED577EA4-891D-A246-93B2-3B44A5BC8805}" type="datetimeFigureOut">
               <a:rPr lang="en-US" smtClean="0"/>
-              <a:t>5/18/24</a:t>
+              <a:t>5/23/24</a:t>
             </a:fld>
             <a:endParaRPr lang="en-US"/>
           </a:p>
@@ -2566,7 +2565,7 @@
           <a:p>
             <a:fld id="{ED577EA4-891D-A246-93B2-3B44A5BC8805}" type="datetimeFigureOut">
               <a:rPr lang="en-US" smtClean="0"/>
-              <a:t>5/18/24</a:t>
+              <a:t>5/23/24</a:t>
             </a:fld>
             <a:endParaRPr lang="en-US"/>
           </a:p>
@@ -3247,7 +3246,7 @@
           <a:p>
             <a:fld id="{ED577EA4-891D-A246-93B2-3B44A5BC8805}" type="datetimeFigureOut">
               <a:rPr lang="en-US" smtClean="0"/>
-              <a:t>5/18/24</a:t>
+              <a:t>5/23/24</a:t>
             </a:fld>
             <a:endParaRPr lang="en-US"/>
           </a:p>
@@ -4160,7 +4159,7 @@
           <a:p>
             <a:fld id="{ED577EA4-891D-A246-93B2-3B44A5BC8805}" type="datetimeFigureOut">
               <a:rPr lang="en-US" smtClean="0"/>
-              <a:t>5/18/24</a:t>
+              <a:t>5/23/24</a:t>
             </a:fld>
             <a:endParaRPr lang="en-US"/>
           </a:p>
@@ -4473,7 +4472,7 @@
           <a:p>
             <a:fld id="{ED577EA4-891D-A246-93B2-3B44A5BC8805}" type="datetimeFigureOut">
               <a:rPr lang="en-US" smtClean="0"/>
-              <a:t>5/18/24</a:t>
+              <a:t>5/23/24</a:t>
             </a:fld>
             <a:endParaRPr lang="en-US"/>
           </a:p>
@@ -4737,7 +4736,7 @@
           <a:p>
             <a:fld id="{ED577EA4-891D-A246-93B2-3B44A5BC8805}" type="datetimeFigureOut">
               <a:rPr lang="en-US" smtClean="0"/>
-              <a:t>5/18/24</a:t>
+              <a:t>5/23/24</a:t>
             </a:fld>
             <a:endParaRPr lang="en-US"/>
           </a:p>
@@ -5060,7 +5059,7 @@
           <a:p>
             <a:fld id="{ED577EA4-891D-A246-93B2-3B44A5BC8805}" type="datetimeFigureOut">
               <a:rPr lang="en-US" smtClean="0"/>
-              <a:t>5/18/24</a:t>
+              <a:t>5/23/24</a:t>
             </a:fld>
             <a:endParaRPr lang="en-US"/>
           </a:p>
@@ -5449,7 +5448,7 @@
           <a:p>
             <a:fld id="{ED577EA4-891D-A246-93B2-3B44A5BC8805}" type="datetimeFigureOut">
               <a:rPr lang="en-US" smtClean="0"/>
-              <a:t>5/18/24</a:t>
+              <a:t>5/23/24</a:t>
             </a:fld>
             <a:endParaRPr lang="en-US"/>
           </a:p>
@@ -5825,7 +5824,7 @@
           <a:p>
             <a:fld id="{ED577EA4-891D-A246-93B2-3B44A5BC8805}" type="datetimeFigureOut">
               <a:rPr lang="en-US" smtClean="0"/>
-              <a:t>5/18/24</a:t>
+              <a:t>5/23/24</a:t>
             </a:fld>
             <a:endParaRPr lang="en-US"/>
           </a:p>
@@ -6331,7 +6330,7 @@
           <a:p>
             <a:fld id="{ED577EA4-891D-A246-93B2-3B44A5BC8805}" type="datetimeFigureOut">
               <a:rPr lang="en-US" smtClean="0"/>
-              <a:t>5/18/24</a:t>
+              <a:t>5/23/24</a:t>
             </a:fld>
             <a:endParaRPr lang="en-US"/>
           </a:p>
@@ -6588,7 +6587,7 @@
           <a:p>
             <a:fld id="{ED577EA4-891D-A246-93B2-3B44A5BC8805}" type="datetimeFigureOut">
               <a:rPr lang="en-US" smtClean="0"/>
-              <a:t>5/18/24</a:t>
+              <a:t>5/23/24</a:t>
             </a:fld>
             <a:endParaRPr lang="en-US"/>
           </a:p>
@@ -6751,7 +6750,7 @@
           <a:p>
             <a:fld id="{ED577EA4-891D-A246-93B2-3B44A5BC8805}" type="datetimeFigureOut">
               <a:rPr lang="en-US" smtClean="0"/>
-              <a:t>5/18/24</a:t>
+              <a:t>5/23/24</a:t>
             </a:fld>
             <a:endParaRPr lang="en-US"/>
           </a:p>
@@ -7141,7 +7140,7 @@
           <a:p>
             <a:fld id="{ED577EA4-891D-A246-93B2-3B44A5BC8805}" type="datetimeFigureOut">
               <a:rPr lang="en-US" smtClean="0"/>
-              <a:t>5/18/24</a:t>
+              <a:t>5/23/24</a:t>
             </a:fld>
             <a:endParaRPr lang="en-US"/>
           </a:p>
@@ -7550,7 +7549,7 @@
           <a:p>
             <a:fld id="{ED577EA4-891D-A246-93B2-3B44A5BC8805}" type="datetimeFigureOut">
               <a:rPr lang="en-US" smtClean="0"/>
-              <a:t>5/18/24</a:t>
+              <a:t>5/23/24</a:t>
             </a:fld>
             <a:endParaRPr lang="en-US"/>
           </a:p>
@@ -7794,7 +7793,7 @@
           <a:p>
             <a:fld id="{ED577EA4-891D-A246-93B2-3B44A5BC8805}" type="datetimeFigureOut">
               <a:rPr lang="en-US" smtClean="0"/>
-              <a:t>5/18/24</a:t>
+              <a:t>5/23/24</a:t>
             </a:fld>
             <a:endParaRPr lang="en-US"/>
           </a:p>
@@ -8320,7 +8319,13 @@
       </p:grpSpPr>
       <p:sp>
         <p:nvSpPr>
-          <p:cNvPr id="2" name="Title 1"/>
+          <p:cNvPr id="2" name="Title 1">
+            <a:extLst>
+              <a:ext uri="{FF2B5EF4-FFF2-40B4-BE49-F238E27FC236}">
+                <a16:creationId xmlns:a16="http://schemas.microsoft.com/office/drawing/2014/main" id="{90EBD850-3554-2200-EB33-F6515972CE5F}"/>
+              </a:ext>
+            </a:extLst>
+          </p:cNvPr>
           <p:cNvSpPr>
             <a:spLocks noGrp="1"/>
           </p:cNvSpPr>
@@ -8334,19 +8339,37 @@
           <a:lstStyle/>
           <a:p>
             <a:r>
+              <a:rPr lang="en-US" dirty="0"/>
+              <a:t>I know </a:t>
+            </a:r>
+            <a:r>
+              <a:rPr lang="en-US" dirty="0" err="1"/>
+              <a:t>ObsPy</a:t>
+            </a:r>
+            <a:r>
+              <a:rPr lang="en-US" dirty="0"/>
+              <a:t> well, why should I move to </a:t>
+            </a:r>
+            <a:r>
               <a:rPr lang="en-US" dirty="0" err="1"/>
               <a:t>MsPASS</a:t>
             </a:r>
             <a:r>
               <a:rPr lang="en-US" dirty="0"/>
-              <a:t> is NOT</a:t>
-            </a:r>
-          </a:p>
-        </p:txBody>
-      </p:sp>
-      <p:sp>
-        <p:nvSpPr>
-          <p:cNvPr id="3" name="Content Placeholder 2"/>
+              <a:t>?</a:t>
+            </a:r>
+          </a:p>
+        </p:txBody>
+      </p:sp>
+      <p:sp>
+        <p:nvSpPr>
+          <p:cNvPr id="3" name="Content Placeholder 2">
+            <a:extLst>
+              <a:ext uri="{FF2B5EF4-FFF2-40B4-BE49-F238E27FC236}">
+                <a16:creationId xmlns:a16="http://schemas.microsoft.com/office/drawing/2014/main" id="{5C937B2F-9146-1595-63B2-E2547A425738}"/>
+              </a:ext>
+            </a:extLst>
+          </p:cNvPr>
           <p:cNvSpPr>
             <a:spLocks noGrp="1"/>
           </p:cNvSpPr>
@@ -8357,61 +8380,75 @@
         <p:spPr/>
         <p:txBody>
           <a:bodyPr>
-            <a:normAutofit/>
+            <a:normAutofit fontScale="92500" lnSpcReduction="10000"/>
           </a:bodyPr>
           <a:lstStyle/>
           <a:p>
             <a:r>
               <a:rPr lang="en-US" dirty="0"/>
-              <a:t>Ideal solution for problems we viewed as solved:</a:t>
+              <a:t>If you are only working with 10000 or less waveforms at a time it won’t help</a:t>
+            </a:r>
+          </a:p>
+          <a:p>
+            <a:r>
+              <a:rPr lang="en-US" dirty="0"/>
+              <a:t>For large data sets</a:t>
             </a:r>
           </a:p>
           <a:p>
             <a:pPr lvl="1"/>
             <a:r>
               <a:rPr lang="en-US" dirty="0"/>
-              <a:t>Real time data handling</a:t>
+              <a:t>Integrated database for data management essential</a:t>
             </a:r>
           </a:p>
           <a:p>
             <a:pPr lvl="1"/>
             <a:r>
               <a:rPr lang="en-US" dirty="0"/>
-              <a:t>Seismic event catalog processing</a:t>
+              <a:t>Clean error handling to run large jobs running for hours</a:t>
             </a:r>
           </a:p>
           <a:p>
             <a:pPr lvl="1"/>
             <a:r>
               <a:rPr lang="en-US" dirty="0"/>
-              <a:t>Seismic reflection processing </a:t>
+              <a:t>Parallel processing functionality</a:t>
             </a:r>
           </a:p>
           <a:p>
             <a:pPr lvl="1"/>
             <a:r>
               <a:rPr lang="en-US" dirty="0"/>
-              <a:t>Archival data management </a:t>
-            </a:r>
-          </a:p>
-          <a:p>
-            <a:r>
-              <a:rPr lang="en-US" dirty="0"/>
-              <a:t>A complete solution for all of seismology</a:t>
-            </a:r>
-          </a:p>
-          <a:p>
-            <a:pPr lvl="1"/>
-            <a:r>
-              <a:rPr lang="en-US" dirty="0"/>
-              <a:t>This is a framework, not a turnkey solution to all problems – may require some work to develop your custom “workflow”</a:t>
-            </a:r>
-          </a:p>
-          <a:p>
-            <a:pPr lvl="1"/>
-            <a:r>
-              <a:rPr lang="en-US" dirty="0"/>
-              <a:t>More custom solutions require contributions from people like you</a:t>
+              <a:t>Cross-platform </a:t>
+            </a:r>
+            <a:r>
+              <a:rPr lang="en-US" dirty="0" err="1"/>
+              <a:t>compability</a:t>
+            </a:r>
+            <a:r>
+              <a:rPr lang="en-US" dirty="0"/>
+              <a:t> – runs on desktop to highest end supercomputer or cloud system</a:t>
+            </a:r>
+          </a:p>
+          <a:p>
+            <a:r>
+              <a:rPr lang="en-US" dirty="0"/>
+              <a:t>Likely to become the standard for low-level interaction with new </a:t>
+            </a:r>
+            <a:r>
+              <a:rPr lang="en-US" dirty="0" err="1"/>
+              <a:t>Earthscope</a:t>
+            </a:r>
+            <a:r>
+              <a:rPr lang="en-US" dirty="0"/>
+              <a:t> cloud system</a:t>
+            </a:r>
+          </a:p>
+          <a:p>
+            <a:r>
+              <a:rPr lang="en-US" dirty="0"/>
+              <a:t>Reproducibility</a:t>
             </a:r>
           </a:p>
         </p:txBody>
@@ -8419,7 +8456,7 @@
     </p:spTree>
     <p:extLst>
       <p:ext uri="{BB962C8B-B14F-4D97-AF65-F5344CB8AC3E}">
-        <p14:creationId xmlns:p14="http://schemas.microsoft.com/office/powerpoint/2010/main" val="1889239079"/>
+        <p14:creationId xmlns:p14="http://schemas.microsoft.com/office/powerpoint/2010/main" val="1310016951"/>
       </p:ext>
     </p:extLst>
   </p:cSld>
@@ -8451,7 +8488,7 @@
           <p:cNvPr id="2" name="Title 1">
             <a:extLst>
               <a:ext uri="{FF2B5EF4-FFF2-40B4-BE49-F238E27FC236}">
-                <a16:creationId xmlns:a16="http://schemas.microsoft.com/office/drawing/2014/main" id="{E4FAF576-B548-B19E-7F5C-9AA2956B74D9}"/>
+                <a16:creationId xmlns:a16="http://schemas.microsoft.com/office/drawing/2014/main" id="{C3AFD8F0-BD51-A8EA-F65A-4D5B1C5F66AB}"/>
               </a:ext>
             </a:extLst>
           </p:cNvPr>
@@ -8469,7 +8506,7 @@
           <a:p>
             <a:r>
               <a:rPr lang="en-US" dirty="0"/>
-              <a:t>Discussion</a:t>
+              <a:t>Documentation, documentation, documentation:</a:t>
             </a:r>
           </a:p>
         </p:txBody>
@@ -8479,7 +8516,7 @@
           <p:cNvPr id="3" name="Content Placeholder 2">
             <a:extLst>
               <a:ext uri="{FF2B5EF4-FFF2-40B4-BE49-F238E27FC236}">
-                <a16:creationId xmlns:a16="http://schemas.microsoft.com/office/drawing/2014/main" id="{A6A362C6-397D-89D3-B942-664DD36E89B5}"/>
+                <a16:creationId xmlns:a16="http://schemas.microsoft.com/office/drawing/2014/main" id="{7E6F0343-D89A-293A-ECC8-AC8BEA66DFFD}"/>
               </a:ext>
             </a:extLst>
           </p:cNvPr>
@@ -8496,12 +8533,41 @@
           <a:lstStyle/>
           <a:p>
             <a:r>
-              <a:rPr lang="en-US" dirty="0" err="1"/>
-              <a:t>MsPASS</a:t>
-            </a:r>
-            <a:r>
-              <a:rPr lang="en-US" dirty="0"/>
-              <a:t> is a framework for research computing.   What does the “research” keyword mean in this context?</a:t>
+              <a:rPr lang="en-US" dirty="0">
+                <a:hlinkClick r:id="rId2"/>
+              </a:rPr>
+              <a:t>User Manual</a:t>
+            </a:r>
+            <a:endParaRPr lang="en-US" dirty="0"/>
+          </a:p>
+          <a:p>
+            <a:r>
+              <a:rPr lang="en-US" dirty="0">
+                <a:hlinkClick r:id="rId3"/>
+              </a:rPr>
+              <a:t>Python API Reference</a:t>
+            </a:r>
+            <a:endParaRPr lang="en-US" dirty="0"/>
+          </a:p>
+          <a:p>
+            <a:r>
+              <a:rPr lang="en-US" dirty="0">
+                <a:hlinkClick r:id="rId4"/>
+              </a:rPr>
+              <a:t>C++ API</a:t>
+            </a:r>
+            <a:endParaRPr lang="en-US" dirty="0"/>
+          </a:p>
+          <a:p>
+            <a:r>
+              <a:rPr lang="en-US" dirty="0">
+                <a:hlinkClick r:id="rId5"/>
+              </a:rPr>
+              <a:t>Tutorials</a:t>
+            </a:r>
+            <a:r>
+              <a:rPr lang="en-US" dirty="0"/>
+              <a:t> – you all should have cloned this repository already</a:t>
             </a:r>
           </a:p>
         </p:txBody>
@@ -8509,7 +8575,7 @@
     </p:spTree>
     <p:extLst>
       <p:ext uri="{BB962C8B-B14F-4D97-AF65-F5344CB8AC3E}">
-        <p14:creationId xmlns:p14="http://schemas.microsoft.com/office/powerpoint/2010/main" val="126902777"/>
+        <p14:creationId xmlns:p14="http://schemas.microsoft.com/office/powerpoint/2010/main" val="3366715822"/>
       </p:ext>
     </p:extLst>
   </p:cSld>
@@ -8538,13 +8604,7 @@
       </p:grpSpPr>
       <p:sp>
         <p:nvSpPr>
-          <p:cNvPr id="2" name="Title 1">
-            <a:extLst>
-              <a:ext uri="{FF2B5EF4-FFF2-40B4-BE49-F238E27FC236}">
-                <a16:creationId xmlns:a16="http://schemas.microsoft.com/office/drawing/2014/main" id="{134510BD-7BF3-4542-F66C-6A18A8B5F307}"/>
-              </a:ext>
-            </a:extLst>
-          </p:cNvPr>
+          <p:cNvPr id="2" name="Title 1"/>
           <p:cNvSpPr>
             <a:spLocks noGrp="1"/>
           </p:cNvSpPr>
@@ -8558,150 +8618,89 @@
           <a:lstStyle/>
           <a:p>
             <a:r>
-              <a:rPr lang="en-US" dirty="0"/>
-              <a:t>Production versus Research IT systems</a:t>
-            </a:r>
-          </a:p>
-        </p:txBody>
-      </p:sp>
-      <p:sp>
-        <p:nvSpPr>
-          <p:cNvPr id="3" name="Content Placeholder 2">
-            <a:extLst>
-              <a:ext uri="{FF2B5EF4-FFF2-40B4-BE49-F238E27FC236}">
-                <a16:creationId xmlns:a16="http://schemas.microsoft.com/office/drawing/2014/main" id="{618D0A6C-581C-093E-9CB5-21FCB6FDCB17}"/>
-              </a:ext>
-            </a:extLst>
-          </p:cNvPr>
-          <p:cNvSpPr>
-            <a:spLocks noGrp="1"/>
-          </p:cNvSpPr>
-          <p:nvPr>
-            <p:ph sz="half" idx="1"/>
+              <a:rPr lang="en-US" dirty="0" err="1"/>
+              <a:t>MsPASS</a:t>
+            </a:r>
+            <a:r>
+              <a:rPr lang="en-US" dirty="0"/>
+              <a:t> is NOT</a:t>
+            </a:r>
+          </a:p>
+        </p:txBody>
+      </p:sp>
+      <p:sp>
+        <p:nvSpPr>
+          <p:cNvPr id="3" name="Content Placeholder 2"/>
+          <p:cNvSpPr>
+            <a:spLocks noGrp="1"/>
+          </p:cNvSpPr>
+          <p:nvPr>
+            <p:ph idx="1"/>
           </p:nvPr>
         </p:nvSpPr>
         <p:spPr/>
         <p:txBody>
           <a:bodyPr>
-            <a:normAutofit fontScale="92500"/>
+            <a:normAutofit/>
           </a:bodyPr>
           <a:lstStyle/>
           <a:p>
-            <a:pPr marL="0" indent="0">
-              <a:buNone/>
-            </a:pPr>
-            <a:r>
-              <a:rPr lang="en-US" i="1" u="sng" dirty="0"/>
-              <a:t>Production</a:t>
-            </a:r>
-          </a:p>
-          <a:p>
-            <a:r>
-              <a:rPr lang="en-US" dirty="0"/>
-              <a:t>Solves Specific Problem</a:t>
-            </a:r>
-          </a:p>
-          <a:p>
-            <a:r>
-              <a:rPr lang="en-US" dirty="0"/>
-              <a:t>Performance is critical</a:t>
+            <a:r>
+              <a:rPr lang="en-US" dirty="0"/>
+              <a:t>Ideal solution for problems we viewed as solved:</a:t>
             </a:r>
           </a:p>
           <a:p>
             <a:pPr lvl="1"/>
             <a:r>
               <a:rPr lang="en-US" dirty="0"/>
-              <a:t>Time is money</a:t>
+              <a:t>Real time data handling</a:t>
             </a:r>
           </a:p>
           <a:p>
             <a:pPr lvl="1"/>
             <a:r>
               <a:rPr lang="en-US" dirty="0"/>
-              <a:t>Mission critical role with repeating tasks</a:t>
-            </a:r>
-          </a:p>
-          <a:p>
-            <a:r>
-              <a:rPr lang="en-US" dirty="0"/>
-              <a:t>Operable with minimum skill set necessary for job</a:t>
-            </a:r>
-          </a:p>
-          <a:p>
-            <a:r>
-              <a:rPr lang="en-US" dirty="0"/>
-              <a:t>Data model well known and fixed</a:t>
-            </a:r>
-          </a:p>
-        </p:txBody>
-      </p:sp>
-      <p:sp>
-        <p:nvSpPr>
-          <p:cNvPr id="4" name="Content Placeholder 3">
-            <a:extLst>
-              <a:ext uri="{FF2B5EF4-FFF2-40B4-BE49-F238E27FC236}">
-                <a16:creationId xmlns:a16="http://schemas.microsoft.com/office/drawing/2014/main" id="{C77F07C0-7492-A32E-C511-061340E47C0A}"/>
-              </a:ext>
-            </a:extLst>
-          </p:cNvPr>
-          <p:cNvSpPr>
-            <a:spLocks noGrp="1"/>
-          </p:cNvSpPr>
-          <p:nvPr>
-            <p:ph sz="half" idx="2"/>
-          </p:nvPr>
-        </p:nvSpPr>
-        <p:spPr/>
-        <p:txBody>
-          <a:bodyPr>
-            <a:normAutofit fontScale="92500"/>
-          </a:bodyPr>
-          <a:lstStyle/>
-          <a:p>
-            <a:pPr marL="0" indent="0">
-              <a:buNone/>
-            </a:pPr>
-            <a:r>
-              <a:rPr lang="en-US" i="1" u="sng" dirty="0"/>
-              <a:t>Research</a:t>
-            </a:r>
-          </a:p>
-          <a:p>
-            <a:r>
-              <a:rPr lang="en-US" dirty="0"/>
-              <a:t>Handle range of problems </a:t>
-            </a:r>
-          </a:p>
-          <a:p>
-            <a:r>
-              <a:rPr lang="en-US" dirty="0"/>
-              <a:t>Performance is secondary</a:t>
+              <a:t>Seismic event catalog processing</a:t>
             </a:r>
           </a:p>
           <a:p>
             <a:pPr lvl="1"/>
             <a:r>
               <a:rPr lang="en-US" dirty="0"/>
-              <a:t>Feasible sufficient</a:t>
+              <a:t>Seismic reflection processing </a:t>
             </a:r>
           </a:p>
           <a:p>
             <a:pPr lvl="1"/>
             <a:r>
               <a:rPr lang="en-US" dirty="0"/>
-              <a:t>Many one-up solutions</a:t>
-            </a:r>
-          </a:p>
-          <a:p>
-            <a:r>
-              <a:rPr lang="en-US" dirty="0"/>
-              <a:t>Can assume users are specialists and life-long learners</a:t>
-            </a:r>
-          </a:p>
-          <a:p>
-            <a:r>
-              <a:rPr lang="en-US" dirty="0"/>
-              <a:t>Data highly variable (one person’s signal is another’s noise)</a:t>
+              <a:t>Archival data management for </a:t>
+            </a:r>
+            <a:r>
+              <a:rPr lang="en-US" dirty="0" err="1"/>
+              <a:t>Earthscope</a:t>
+            </a:r>
+            <a:endParaRPr lang="en-US" dirty="0"/>
+          </a:p>
+          <a:p>
+            <a:r>
+              <a:rPr lang="en-US" dirty="0"/>
+              <a:t>A complete solution for all of seismology</a:t>
+            </a:r>
+          </a:p>
+          <a:p>
+            <a:pPr lvl="1"/>
+            <a:r>
+              <a:rPr lang="en-US" dirty="0"/>
+              <a:t>This is a framework, not a turnkey solution to all problems – may require some work to develop your custom “workflow”</a:t>
+            </a:r>
+          </a:p>
+          <a:p>
+            <a:pPr lvl="1"/>
+            <a:r>
+              <a:rPr lang="en-US" dirty="0"/>
+              <a:t>More custom solutions require contributions from people like you</a:t>
             </a:r>
           </a:p>
         </p:txBody>
@@ -8709,7 +8708,7 @@
     </p:spTree>
     <p:extLst>
       <p:ext uri="{BB962C8B-B14F-4D97-AF65-F5344CB8AC3E}">
-        <p14:creationId xmlns:p14="http://schemas.microsoft.com/office/powerpoint/2010/main" val="2242568584"/>
+        <p14:creationId xmlns:p14="http://schemas.microsoft.com/office/powerpoint/2010/main" val="1889239079"/>
       </p:ext>
     </p:extLst>
   </p:cSld>
@@ -8738,10 +8737,10 @@
       </p:grpSpPr>
       <p:sp>
         <p:nvSpPr>
-          <p:cNvPr id="5" name="Title 4">
+          <p:cNvPr id="2" name="Title 1">
             <a:extLst>
               <a:ext uri="{FF2B5EF4-FFF2-40B4-BE49-F238E27FC236}">
-                <a16:creationId xmlns:a16="http://schemas.microsoft.com/office/drawing/2014/main" id="{84CA6C25-7724-8B0D-E985-9B1FD3EB1547}"/>
+                <a16:creationId xmlns:a16="http://schemas.microsoft.com/office/drawing/2014/main" id="{328A76E3-09BB-5D80-BC7C-ABE5D895F298}"/>
               </a:ext>
             </a:extLst>
           </p:cNvPr>
@@ -8759,25 +8758,17 @@
           <a:p>
             <a:r>
               <a:rPr lang="en-US" dirty="0"/>
-              <a:t>Key Roles </a:t>
-            </a:r>
-            <a:r>
-              <a:rPr lang="en-US" dirty="0" err="1"/>
-              <a:t>MsPASS</a:t>
-            </a:r>
-            <a:r>
-              <a:rPr lang="en-US" dirty="0"/>
-              <a:t> can play in research today</a:t>
-            </a:r>
-          </a:p>
-        </p:txBody>
-      </p:sp>
-      <p:sp>
-        <p:nvSpPr>
-          <p:cNvPr id="6" name="Content Placeholder 5">
+              <a:t>Hands on exercise part one:  Data management</a:t>
+            </a:r>
+          </a:p>
+        </p:txBody>
+      </p:sp>
+      <p:sp>
+        <p:nvSpPr>
+          <p:cNvPr id="3" name="Content Placeholder 2">
             <a:extLst>
               <a:ext uri="{FF2B5EF4-FFF2-40B4-BE49-F238E27FC236}">
-                <a16:creationId xmlns:a16="http://schemas.microsoft.com/office/drawing/2014/main" id="{0AE10C19-B2B5-CED9-9CE7-C3D4FC5D96FE}"/>
+                <a16:creationId xmlns:a16="http://schemas.microsoft.com/office/drawing/2014/main" id="{B737B93E-1B46-066F-C50E-311A394B4AFA}"/>
               </a:ext>
             </a:extLst>
           </p:cNvPr>
@@ -8795,232 +8786,47 @@
           <a:p>
             <a:r>
               <a:rPr lang="en-US" dirty="0"/>
-              <a:t>Manage large data sets </a:t>
-            </a:r>
-          </a:p>
-          <a:p>
-            <a:r>
-              <a:rPr lang="en-US" dirty="0"/>
-              <a:t>Tools for low-level work to assemble event-based data</a:t>
-            </a:r>
-          </a:p>
-          <a:p>
-            <a:r>
-              <a:rPr lang="en-US" dirty="0"/>
-              <a:t>Generic parallel tools for handling continuous data</a:t>
-            </a:r>
-          </a:p>
-          <a:p>
-            <a:r>
-              <a:rPr lang="en-US" dirty="0"/>
-              <a:t>Complete set of tools for P-wave receiver function processing</a:t>
-            </a:r>
-          </a:p>
-          <a:p>
-            <a:r>
-              <a:rPr lang="en-US" dirty="0"/>
-              <a:t>Tools for spectral estimation</a:t>
-            </a:r>
-          </a:p>
-        </p:txBody>
-      </p:sp>
-      <p:grpSp>
-        <p:nvGrpSpPr>
-          <p:cNvPr id="9" name="Group 8">
-            <a:extLst>
-              <a:ext uri="{FF2B5EF4-FFF2-40B4-BE49-F238E27FC236}">
-                <a16:creationId xmlns:a16="http://schemas.microsoft.com/office/drawing/2014/main" id="{AE1235E6-FEA4-FEB0-904D-19E360EBD4D0}"/>
-              </a:ext>
-            </a:extLst>
-          </p:cNvPr>
-          <p:cNvGrpSpPr/>
-          <p:nvPr/>
-        </p:nvGrpSpPr>
-        <p:grpSpPr>
-          <a:xfrm>
-            <a:off x="471488" y="2336873"/>
-            <a:ext cx="11617731" cy="949252"/>
-            <a:chOff x="471488" y="2336873"/>
-            <a:chExt cx="11617731" cy="949252"/>
-          </a:xfrm>
-        </p:grpSpPr>
-        <p:sp>
-          <p:nvSpPr>
-            <p:cNvPr id="7" name="Rectangle 6">
-              <a:extLst>
-                <a:ext uri="{FF2B5EF4-FFF2-40B4-BE49-F238E27FC236}">
-                  <a16:creationId xmlns:a16="http://schemas.microsoft.com/office/drawing/2014/main" id="{C8FB345D-E4B0-C57B-A178-4539F4E76E30}"/>
-                </a:ext>
-              </a:extLst>
-            </p:cNvPr>
-            <p:cNvSpPr/>
-            <p:nvPr/>
-          </p:nvSpPr>
-          <p:spPr>
-            <a:xfrm>
-              <a:off x="471488" y="2336873"/>
-              <a:ext cx="8801100" cy="949252"/>
-            </a:xfrm>
-            <a:prstGeom prst="rect">
-              <a:avLst/>
-            </a:prstGeom>
-            <a:noFill/>
-            <a:ln w="76200">
-              <a:solidFill>
-                <a:srgbClr val="FFFF00"/>
-              </a:solidFill>
-            </a:ln>
-          </p:spPr>
-          <p:style>
-            <a:lnRef idx="2">
-              <a:schemeClr val="accent1">
-                <a:shade val="15000"/>
-              </a:schemeClr>
-            </a:lnRef>
-            <a:fillRef idx="1">
-              <a:schemeClr val="accent1"/>
-            </a:fillRef>
-            <a:effectRef idx="0">
-              <a:schemeClr val="accent1"/>
-            </a:effectRef>
-            <a:fontRef idx="minor">
-              <a:schemeClr val="lt1"/>
-            </a:fontRef>
-          </p:style>
-          <p:txBody>
-            <a:bodyPr rtlCol="0" anchor="ctr"/>
-            <a:lstStyle/>
-            <a:p>
-              <a:pPr algn="ctr"/>
-              <a:endParaRPr lang="en-US"/>
-            </a:p>
-          </p:txBody>
-        </p:sp>
-        <p:sp>
-          <p:nvSpPr>
-            <p:cNvPr id="8" name="TextBox 7">
-              <a:extLst>
-                <a:ext uri="{FF2B5EF4-FFF2-40B4-BE49-F238E27FC236}">
-                  <a16:creationId xmlns:a16="http://schemas.microsoft.com/office/drawing/2014/main" id="{99685190-5D41-1918-A5F1-D5CCA4623A87}"/>
-                </a:ext>
-              </a:extLst>
-            </p:cNvPr>
-            <p:cNvSpPr txBox="1"/>
-            <p:nvPr/>
-          </p:nvSpPr>
-          <p:spPr>
-            <a:xfrm>
-              <a:off x="9569302" y="2466753"/>
-              <a:ext cx="2519917" cy="707886"/>
-            </a:xfrm>
-            <a:prstGeom prst="rect">
-              <a:avLst/>
-            </a:prstGeom>
-            <a:noFill/>
-          </p:spPr>
-          <p:txBody>
-            <a:bodyPr wrap="square" rtlCol="0">
-              <a:spAutoFit/>
-            </a:bodyPr>
-            <a:lstStyle/>
-            <a:p>
-              <a:r>
-                <a:rPr lang="en-US" sz="2000" dirty="0">
-                  <a:solidFill>
-                    <a:srgbClr val="FFFF00"/>
-                  </a:solidFill>
-                </a:rPr>
-                <a:t>Hands on exercise focus</a:t>
-              </a:r>
-            </a:p>
-          </p:txBody>
-        </p:sp>
-      </p:grpSp>
+              <a:t>Indexing </a:t>
+            </a:r>
+            <a:r>
+              <a:rPr lang="en-US" dirty="0" err="1"/>
+              <a:t>miniseed</a:t>
+            </a:r>
+            <a:r>
+              <a:rPr lang="en-US" dirty="0"/>
+              <a:t> files</a:t>
+            </a:r>
+          </a:p>
+          <a:p>
+            <a:r>
+              <a:rPr lang="en-US" dirty="0"/>
+              <a:t>Managing source metadata</a:t>
+            </a:r>
+          </a:p>
+          <a:p>
+            <a:r>
+              <a:rPr lang="en-US" dirty="0"/>
+              <a:t>Managing receiver (station) metadata</a:t>
+            </a:r>
+          </a:p>
+          <a:p>
+            <a:r>
+              <a:rPr lang="en-US" dirty="0"/>
+              <a:t>Seismic data reader and writer abstraction</a:t>
+            </a:r>
+          </a:p>
+        </p:txBody>
+      </p:sp>
     </p:spTree>
     <p:extLst>
       <p:ext uri="{BB962C8B-B14F-4D97-AF65-F5344CB8AC3E}">
-        <p14:creationId xmlns:p14="http://schemas.microsoft.com/office/powerpoint/2010/main" val="2362095333"/>
+        <p14:creationId xmlns:p14="http://schemas.microsoft.com/office/powerpoint/2010/main" val="1393065866"/>
       </p:ext>
     </p:extLst>
   </p:cSld>
   <p:clrMapOvr>
     <a:masterClrMapping/>
   </p:clrMapOvr>
-  <p:timing>
-    <p:tnLst>
-      <p:par>
-        <p:cTn id="1" dur="indefinite" restart="never" nodeType="tmRoot">
-          <p:childTnLst>
-            <p:seq concurrent="1" nextAc="seek">
-              <p:cTn id="2" dur="indefinite" nodeType="mainSeq">
-                <p:childTnLst>
-                  <p:par>
-                    <p:cTn id="3" fill="hold">
-                      <p:stCondLst>
-                        <p:cond delay="indefinite"/>
-                      </p:stCondLst>
-                      <p:childTnLst>
-                        <p:par>
-                          <p:cTn id="4" fill="hold">
-                            <p:stCondLst>
-                              <p:cond delay="0"/>
-                            </p:stCondLst>
-                            <p:childTnLst>
-                              <p:par>
-                                <p:cTn id="5" presetID="1" presetClass="entr" presetSubtype="0" fill="hold" nodeType="clickEffect">
-                                  <p:stCondLst>
-                                    <p:cond delay="0"/>
-                                  </p:stCondLst>
-                                  <p:childTnLst>
-                                    <p:set>
-                                      <p:cBhvr>
-                                        <p:cTn id="6" dur="1" fill="hold">
-                                          <p:stCondLst>
-                                            <p:cond delay="0"/>
-                                          </p:stCondLst>
-                                        </p:cTn>
-                                        <p:tgtEl>
-                                          <p:spTgt spid="9"/>
-                                        </p:tgtEl>
-                                        <p:attrNameLst>
-                                          <p:attrName>style.visibility</p:attrName>
-                                        </p:attrNameLst>
-                                      </p:cBhvr>
-                                      <p:to>
-                                        <p:strVal val="visible"/>
-                                      </p:to>
-                                    </p:set>
-                                  </p:childTnLst>
-                                </p:cTn>
-                              </p:par>
-                            </p:childTnLst>
-                          </p:cTn>
-                        </p:par>
-                      </p:childTnLst>
-                    </p:cTn>
-                  </p:par>
-                </p:childTnLst>
-              </p:cTn>
-              <p:prevCondLst>
-                <p:cond evt="onPrev" delay="0">
-                  <p:tgtEl>
-                    <p:sldTgt/>
-                  </p:tgtEl>
-                </p:cond>
-              </p:prevCondLst>
-              <p:nextCondLst>
-                <p:cond evt="onNext" delay="0">
-                  <p:tgtEl>
-                    <p:sldTgt/>
-                  </p:tgtEl>
-                </p:cond>
-              </p:nextCondLst>
-            </p:seq>
-          </p:childTnLst>
-        </p:cTn>
-      </p:par>
-    </p:tnLst>
-  </p:timing>
 </p:sld>
 </file>
 
@@ -9046,7 +8852,7 @@
           <p:cNvPr id="2" name="Title 1">
             <a:extLst>
               <a:ext uri="{FF2B5EF4-FFF2-40B4-BE49-F238E27FC236}">
-                <a16:creationId xmlns:a16="http://schemas.microsoft.com/office/drawing/2014/main" id="{328A76E3-09BB-5D80-BC7C-ABE5D895F298}"/>
+                <a16:creationId xmlns:a16="http://schemas.microsoft.com/office/drawing/2014/main" id="{AE1F8B95-AE44-5162-2542-89E6537EAA73}"/>
               </a:ext>
             </a:extLst>
           </p:cNvPr>
@@ -9063,8 +8869,12 @@
           <a:lstStyle/>
           <a:p>
             <a:r>
-              <a:rPr lang="en-US" dirty="0"/>
-              <a:t>Hands on exercise part one:  Data management</a:t>
+              <a:rPr lang="en-US" dirty="0" err="1"/>
+              <a:t>MsPASS</a:t>
+            </a:r>
+            <a:r>
+              <a:rPr lang="en-US" dirty="0"/>
+              <a:t> Data Management Technology</a:t>
             </a:r>
           </a:p>
         </p:txBody>
@@ -9074,7 +8884,7 @@
           <p:cNvPr id="3" name="Content Placeholder 2">
             <a:extLst>
               <a:ext uri="{FF2B5EF4-FFF2-40B4-BE49-F238E27FC236}">
-                <a16:creationId xmlns:a16="http://schemas.microsoft.com/office/drawing/2014/main" id="{B737B93E-1B46-066F-C50E-311A394B4AFA}"/>
+                <a16:creationId xmlns:a16="http://schemas.microsoft.com/office/drawing/2014/main" id="{A364105B-EC61-1F63-DA18-33128BDF7A2E}"/>
               </a:ext>
             </a:extLst>
           </p:cNvPr>
@@ -9092,33 +8902,70 @@
           <a:p>
             <a:r>
               <a:rPr lang="en-US" dirty="0"/>
-              <a:t>Indexing </a:t>
+              <a:t>MongoDB is the integrated database of </a:t>
             </a:r>
             <a:r>
               <a:rPr lang="en-US" dirty="0" err="1"/>
-              <a:t>miniseed</a:t>
-            </a:r>
-            <a:r>
-              <a:rPr lang="en-US" dirty="0"/>
-              <a:t> files</a:t>
-            </a:r>
-          </a:p>
-          <a:p>
-            <a:r>
-              <a:rPr lang="en-US" dirty="0"/>
-              <a:t>Managing source metadata</a:t>
-            </a:r>
-          </a:p>
-          <a:p>
-            <a:r>
-              <a:rPr lang="en-US" dirty="0"/>
-              <a:t>Managing receiver (station) metadata</a:t>
-            </a:r>
-          </a:p>
-          <a:p>
-            <a:r>
-              <a:rPr lang="en-US" dirty="0"/>
-              <a:t>Seismic data reader and writer abstraction</a:t>
+              <a:t>MsPASS</a:t>
+            </a:r>
+            <a:endParaRPr lang="en-US" dirty="0"/>
+          </a:p>
+          <a:p>
+            <a:r>
+              <a:rPr lang="en-US" dirty="0"/>
+              <a:t>MongoDB is a “document database”</a:t>
+            </a:r>
+          </a:p>
+          <a:p>
+            <a:pPr lvl="1"/>
+            <a:r>
+              <a:rPr lang="en-US" dirty="0"/>
+              <a:t>Jargon name:   a document == python dictionary</a:t>
+            </a:r>
+          </a:p>
+          <a:p>
+            <a:pPr lvl="1"/>
+            <a:r>
+              <a:rPr lang="en-US" dirty="0"/>
+              <a:t>A “document” is the ultimate seismic header </a:t>
+            </a:r>
+          </a:p>
+          <a:p>
+            <a:pPr lvl="2"/>
+            <a:r>
+              <a:rPr lang="en-US" dirty="0"/>
+              <a:t>You can save almost anything there</a:t>
+            </a:r>
+          </a:p>
+          <a:p>
+            <a:pPr lvl="2"/>
+            <a:r>
+              <a:rPr lang="en-US" dirty="0"/>
+              <a:t>Completely flexible (by default) in what you save</a:t>
+            </a:r>
+          </a:p>
+          <a:p>
+            <a:r>
+              <a:rPr lang="en-US" dirty="0"/>
+              <a:t>See the </a:t>
+            </a:r>
+            <a:r>
+              <a:rPr lang="en-US" dirty="0">
+                <a:hlinkClick r:id="rId2"/>
+              </a:rPr>
+              <a:t>Data Management</a:t>
+            </a:r>
+            <a:r>
+              <a:rPr lang="en-US" dirty="0"/>
+              <a:t> section of the </a:t>
+            </a:r>
+            <a:r>
+              <a:rPr lang="en-US" dirty="0" err="1"/>
+              <a:t>MsPASS</a:t>
+            </a:r>
+            <a:r>
+              <a:rPr lang="en-US" dirty="0"/>
+              <a:t> User Manual </a:t>
             </a:r>
           </a:p>
         </p:txBody>
@@ -9126,7 +8973,7 @@
     </p:spTree>
     <p:extLst>
       <p:ext uri="{BB962C8B-B14F-4D97-AF65-F5344CB8AC3E}">
-        <p14:creationId xmlns:p14="http://schemas.microsoft.com/office/powerpoint/2010/main" val="1393065866"/>
+        <p14:creationId xmlns:p14="http://schemas.microsoft.com/office/powerpoint/2010/main" val="3975055621"/>
       </p:ext>
     </p:extLst>
   </p:cSld>
@@ -9155,10 +9002,10 @@
       </p:grpSpPr>
       <p:sp>
         <p:nvSpPr>
-          <p:cNvPr id="2" name="Title 1">
+          <p:cNvPr id="4" name="Title 3">
             <a:extLst>
               <a:ext uri="{FF2B5EF4-FFF2-40B4-BE49-F238E27FC236}">
-                <a16:creationId xmlns:a16="http://schemas.microsoft.com/office/drawing/2014/main" id="{AE1F8B95-AE44-5162-2542-89E6537EAA73}"/>
+                <a16:creationId xmlns:a16="http://schemas.microsoft.com/office/drawing/2014/main" id="{40E2DDBD-DCC6-82B5-06BB-A1C41789925C}"/>
               </a:ext>
             </a:extLst>
           </p:cNvPr>
@@ -9175,22 +9022,26 @@
           <a:lstStyle/>
           <a:p>
             <a:r>
+              <a:rPr lang="en-US" dirty="0"/>
+              <a:t>To </a:t>
+            </a:r>
+            <a:r>
               <a:rPr lang="en-US" dirty="0" err="1"/>
-              <a:t>MsPASS</a:t>
-            </a:r>
-            <a:r>
-              <a:rPr lang="en-US" dirty="0"/>
-              <a:t> Data Management Technology</a:t>
-            </a:r>
-          </a:p>
-        </p:txBody>
-      </p:sp>
-      <p:sp>
-        <p:nvSpPr>
-          <p:cNvPr id="3" name="Content Placeholder 2">
+              <a:t>Jupyter</a:t>
+            </a:r>
+            <a:r>
+              <a:rPr lang="en-US" dirty="0"/>
+              <a:t> Notebook</a:t>
+            </a:r>
+          </a:p>
+        </p:txBody>
+      </p:sp>
+      <p:sp>
+        <p:nvSpPr>
+          <p:cNvPr id="5" name="Content Placeholder 4">
             <a:extLst>
               <a:ext uri="{FF2B5EF4-FFF2-40B4-BE49-F238E27FC236}">
-                <a16:creationId xmlns:a16="http://schemas.microsoft.com/office/drawing/2014/main" id="{A364105B-EC61-1F63-DA18-33128BDF7A2E}"/>
+                <a16:creationId xmlns:a16="http://schemas.microsoft.com/office/drawing/2014/main" id="{BB5A0798-A6FC-64E9-ED1F-0BC451A19C0E}"/>
               </a:ext>
             </a:extLst>
           </p:cNvPr>
@@ -9208,70 +9059,20 @@
           <a:p>
             <a:r>
               <a:rPr lang="en-US" dirty="0"/>
-              <a:t>MongoDB is the integrated database of </a:t>
-            </a:r>
-            <a:r>
-              <a:rPr lang="en-US" dirty="0" err="1"/>
-              <a:t>MsPASS</a:t>
-            </a:r>
-            <a:endParaRPr lang="en-US" dirty="0"/>
-          </a:p>
-          <a:p>
-            <a:r>
-              <a:rPr lang="en-US" dirty="0"/>
-              <a:t>MongoDB is a “document database”</a:t>
-            </a:r>
-          </a:p>
-          <a:p>
-            <a:pPr lvl="1"/>
-            <a:r>
-              <a:rPr lang="en-US" dirty="0"/>
-              <a:t>Jargon name:   a document == python dictionary</a:t>
-            </a:r>
-          </a:p>
-          <a:p>
-            <a:pPr lvl="1"/>
-            <a:r>
-              <a:rPr lang="en-US" dirty="0"/>
-              <a:t>A “document” is the ultimate seismic header </a:t>
-            </a:r>
-          </a:p>
-          <a:p>
-            <a:pPr lvl="2"/>
-            <a:r>
-              <a:rPr lang="en-US" dirty="0"/>
-              <a:t>You can save almost anything there</a:t>
-            </a:r>
-          </a:p>
-          <a:p>
-            <a:pPr lvl="2"/>
-            <a:r>
-              <a:rPr lang="en-US" dirty="0"/>
-              <a:t>Completely flexible (by default) in what you save</a:t>
-            </a:r>
-          </a:p>
-          <a:p>
-            <a:r>
-              <a:rPr lang="en-US" dirty="0"/>
-              <a:t>See the </a:t>
+              <a:t>Launch docker container as described </a:t>
             </a:r>
             <a:r>
               <a:rPr lang="en-US" dirty="0">
                 <a:hlinkClick r:id="rId2"/>
               </a:rPr>
-              <a:t>Data Management</a:t>
-            </a:r>
-            <a:r>
-              <a:rPr lang="en-US" dirty="0"/>
-              <a:t> section of the </a:t>
-            </a:r>
-            <a:r>
-              <a:rPr lang="en-US" dirty="0" err="1"/>
-              <a:t>MsPASS</a:t>
-            </a:r>
-            <a:r>
-              <a:rPr lang="en-US" dirty="0"/>
-              <a:t> User Manual </a:t>
+              <a:t>here</a:t>
+            </a:r>
+            <a:endParaRPr lang="en-US" dirty="0"/>
+          </a:p>
+          <a:p>
+            <a:r>
+              <a:rPr lang="en-US" dirty="0"/>
+              <a:t>Probably will want to append “:v2.0.1” tag  to run line</a:t>
             </a:r>
           </a:p>
         </p:txBody>
@@ -9279,7 +9080,7 @@
     </p:spTree>
     <p:extLst>
       <p:ext uri="{BB962C8B-B14F-4D97-AF65-F5344CB8AC3E}">
-        <p14:creationId xmlns:p14="http://schemas.microsoft.com/office/powerpoint/2010/main" val="3975055621"/>
+        <p14:creationId xmlns:p14="http://schemas.microsoft.com/office/powerpoint/2010/main" val="2501134110"/>
       </p:ext>
     </p:extLst>
   </p:cSld>
@@ -9308,107 +9109,6 @@
       </p:grpSpPr>
       <p:sp>
         <p:nvSpPr>
-          <p:cNvPr id="4" name="Title 3">
-            <a:extLst>
-              <a:ext uri="{FF2B5EF4-FFF2-40B4-BE49-F238E27FC236}">
-                <a16:creationId xmlns:a16="http://schemas.microsoft.com/office/drawing/2014/main" id="{40E2DDBD-DCC6-82B5-06BB-A1C41789925C}"/>
-              </a:ext>
-            </a:extLst>
-          </p:cNvPr>
-          <p:cNvSpPr>
-            <a:spLocks noGrp="1"/>
-          </p:cNvSpPr>
-          <p:nvPr>
-            <p:ph type="title"/>
-          </p:nvPr>
-        </p:nvSpPr>
-        <p:spPr/>
-        <p:txBody>
-          <a:bodyPr/>
-          <a:lstStyle/>
-          <a:p>
-            <a:r>
-              <a:rPr lang="en-US" dirty="0"/>
-              <a:t>To </a:t>
-            </a:r>
-            <a:r>
-              <a:rPr lang="en-US" dirty="0" err="1"/>
-              <a:t>Jupyter</a:t>
-            </a:r>
-            <a:r>
-              <a:rPr lang="en-US" dirty="0"/>
-              <a:t> Notebook</a:t>
-            </a:r>
-          </a:p>
-        </p:txBody>
-      </p:sp>
-      <p:sp>
-        <p:nvSpPr>
-          <p:cNvPr id="5" name="Content Placeholder 4">
-            <a:extLst>
-              <a:ext uri="{FF2B5EF4-FFF2-40B4-BE49-F238E27FC236}">
-                <a16:creationId xmlns:a16="http://schemas.microsoft.com/office/drawing/2014/main" id="{BB5A0798-A6FC-64E9-ED1F-0BC451A19C0E}"/>
-              </a:ext>
-            </a:extLst>
-          </p:cNvPr>
-          <p:cNvSpPr>
-            <a:spLocks noGrp="1"/>
-          </p:cNvSpPr>
-          <p:nvPr>
-            <p:ph idx="1"/>
-          </p:nvPr>
-        </p:nvSpPr>
-        <p:spPr/>
-        <p:txBody>
-          <a:bodyPr/>
-          <a:lstStyle/>
-          <a:p>
-            <a:r>
-              <a:rPr lang="en-US" dirty="0"/>
-              <a:t>Launch docker container as described </a:t>
-            </a:r>
-            <a:r>
-              <a:rPr lang="en-US" dirty="0">
-                <a:hlinkClick r:id="rId2"/>
-              </a:rPr>
-              <a:t>here</a:t>
-            </a:r>
-            <a:endParaRPr lang="en-US" dirty="0"/>
-          </a:p>
-        </p:txBody>
-      </p:sp>
-    </p:spTree>
-    <p:extLst>
-      <p:ext uri="{BB962C8B-B14F-4D97-AF65-F5344CB8AC3E}">
-        <p14:creationId xmlns:p14="http://schemas.microsoft.com/office/powerpoint/2010/main" val="2501134110"/>
-      </p:ext>
-    </p:extLst>
-  </p:cSld>
-  <p:clrMapOvr>
-    <a:masterClrMapping/>
-  </p:clrMapOvr>
-</p:sld>
-</file>
-
-<file path=ppt/slides/slide17.xml><?xml version="1.0" encoding="utf-8"?>
-<p:sld xmlns:a="http://schemas.openxmlformats.org/drawingml/2006/main" xmlns:r="http://schemas.openxmlformats.org/officeDocument/2006/relationships" xmlns:p="http://schemas.openxmlformats.org/presentationml/2006/main">
-  <p:cSld>
-    <p:spTree>
-      <p:nvGrpSpPr>
-        <p:cNvPr id="1" name=""/>
-        <p:cNvGrpSpPr/>
-        <p:nvPr/>
-      </p:nvGrpSpPr>
-      <p:grpSpPr>
-        <a:xfrm>
-          <a:off x="0" y="0"/>
-          <a:ext cx="0" cy="0"/>
-          <a:chOff x="0" y="0"/>
-          <a:chExt cx="0" cy="0"/>
-        </a:xfrm>
-      </p:grpSpPr>
-      <p:sp>
-        <p:nvSpPr>
           <p:cNvPr id="2" name="Title 1">
             <a:extLst>
               <a:ext uri="{FF2B5EF4-FFF2-40B4-BE49-F238E27FC236}">
@@ -9430,7 +9130,7 @@
           <a:p>
             <a:r>
               <a:rPr lang="en-US" dirty="0"/>
-              <a:t>Parallel schedulers</a:t>
+              <a:t>Part 2:  Parallel schedulers</a:t>
             </a:r>
           </a:p>
         </p:txBody>
@@ -9525,7 +9225,7 @@
 </p:sld>
 </file>
 
-<file path=ppt/slides/slide18.xml><?xml version="1.0" encoding="utf-8"?>
+<file path=ppt/slides/slide17.xml><?xml version="1.0" encoding="utf-8"?>
 <p:sld xmlns:a="http://schemas.openxmlformats.org/drawingml/2006/main" xmlns:r="http://schemas.openxmlformats.org/officeDocument/2006/relationships" xmlns:p="http://schemas.openxmlformats.org/presentationml/2006/main">
   <p:cSld>
     <p:spTree>
@@ -10236,7 +9936,7 @@
 </p:sld>
 </file>
 
-<file path=ppt/slides/slide19.xml><?xml version="1.0" encoding="utf-8"?>
+<file path=ppt/slides/slide18.xml><?xml version="1.0" encoding="utf-8"?>
 <p:sld xmlns:a="http://schemas.openxmlformats.org/drawingml/2006/main" xmlns:r="http://schemas.openxmlformats.org/officeDocument/2006/relationships" xmlns:p="http://schemas.openxmlformats.org/presentationml/2006/main">
   <p:cSld>
     <p:spTree>
@@ -10377,115 +10077,7 @@
 </p:sld>
 </file>
 
-<file path=ppt/slides/slide2.xml><?xml version="1.0" encoding="utf-8"?>
-<p:sld xmlns:a="http://schemas.openxmlformats.org/drawingml/2006/main" xmlns:r="http://schemas.openxmlformats.org/officeDocument/2006/relationships" xmlns:p="http://schemas.openxmlformats.org/presentationml/2006/main">
-  <p:cSld>
-    <p:spTree>
-      <p:nvGrpSpPr>
-        <p:cNvPr id="1" name=""/>
-        <p:cNvGrpSpPr/>
-        <p:nvPr/>
-      </p:nvGrpSpPr>
-      <p:grpSpPr>
-        <a:xfrm>
-          <a:off x="0" y="0"/>
-          <a:ext cx="0" cy="0"/>
-          <a:chOff x="0" y="0"/>
-          <a:chExt cx="0" cy="0"/>
-        </a:xfrm>
-      </p:grpSpPr>
-      <p:sp>
-        <p:nvSpPr>
-          <p:cNvPr id="2" name="Title 1">
-            <a:extLst>
-              <a:ext uri="{FF2B5EF4-FFF2-40B4-BE49-F238E27FC236}">
-                <a16:creationId xmlns:a16="http://schemas.microsoft.com/office/drawing/2014/main" id="{BE440928-28C5-1BEB-8E13-6AC181D2E3C9}"/>
-              </a:ext>
-            </a:extLst>
-          </p:cNvPr>
-          <p:cNvSpPr>
-            <a:spLocks noGrp="1"/>
-          </p:cNvSpPr>
-          <p:nvPr>
-            <p:ph type="title"/>
-          </p:nvPr>
-        </p:nvSpPr>
-        <p:spPr/>
-        <p:txBody>
-          <a:bodyPr/>
-          <a:lstStyle/>
-          <a:p>
-            <a:r>
-              <a:rPr lang="en-US" dirty="0"/>
-              <a:t>Overview</a:t>
-            </a:r>
-          </a:p>
-        </p:txBody>
-      </p:sp>
-      <p:sp>
-        <p:nvSpPr>
-          <p:cNvPr id="3" name="Content Placeholder 2">
-            <a:extLst>
-              <a:ext uri="{FF2B5EF4-FFF2-40B4-BE49-F238E27FC236}">
-                <a16:creationId xmlns:a16="http://schemas.microsoft.com/office/drawing/2014/main" id="{79B03794-4D0F-99C0-1C81-5B12609061CE}"/>
-              </a:ext>
-            </a:extLst>
-          </p:cNvPr>
-          <p:cNvSpPr>
-            <a:spLocks noGrp="1"/>
-          </p:cNvSpPr>
-          <p:nvPr>
-            <p:ph idx="1"/>
-          </p:nvPr>
-        </p:nvSpPr>
-        <p:spPr/>
-        <p:txBody>
-          <a:bodyPr/>
-          <a:lstStyle/>
-          <a:p>
-            <a:r>
-              <a:rPr lang="en-US" dirty="0"/>
-              <a:t>Overview lecture on what </a:t>
-            </a:r>
-            <a:r>
-              <a:rPr lang="en-US" dirty="0" err="1"/>
-              <a:t>MsPASS</a:t>
-            </a:r>
-            <a:r>
-              <a:rPr lang="en-US" dirty="0"/>
-              <a:t> is and why you should use it</a:t>
-            </a:r>
-          </a:p>
-          <a:p>
-            <a:r>
-              <a:rPr lang="en-US" dirty="0"/>
-              <a:t>Hands on session working through </a:t>
-            </a:r>
-            <a:r>
-              <a:rPr lang="en-US" dirty="0" err="1"/>
-              <a:t>jupyter</a:t>
-            </a:r>
-            <a:r>
-              <a:rPr lang="en-US" dirty="0"/>
-              <a:t> notebook</a:t>
-            </a:r>
-          </a:p>
-        </p:txBody>
-      </p:sp>
-    </p:spTree>
-    <p:extLst>
-      <p:ext uri="{BB962C8B-B14F-4D97-AF65-F5344CB8AC3E}">
-        <p14:creationId xmlns:p14="http://schemas.microsoft.com/office/powerpoint/2010/main" val="3552250515"/>
-      </p:ext>
-    </p:extLst>
-  </p:cSld>
-  <p:clrMapOvr>
-    <a:masterClrMapping/>
-  </p:clrMapOvr>
-</p:sld>
-</file>
-
-<file path=ppt/slides/slide20.xml><?xml version="1.0" encoding="utf-8"?>
+<file path=ppt/slides/slide19.xml><?xml version="1.0" encoding="utf-8"?>
 <p:sld xmlns:a="http://schemas.openxmlformats.org/drawingml/2006/main" xmlns:r="http://schemas.openxmlformats.org/officeDocument/2006/relationships" xmlns:p="http://schemas.openxmlformats.org/presentationml/2006/main">
   <p:cSld>
     <p:spTree>
@@ -11136,7 +10728,7 @@
 </p:sld>
 </file>
 
-<file path=ppt/slides/slide21.xml><?xml version="1.0" encoding="utf-8"?>
+<file path=ppt/slides/slide2.xml><?xml version="1.0" encoding="utf-8"?>
 <p:sld xmlns:a="http://schemas.openxmlformats.org/drawingml/2006/main" xmlns:r="http://schemas.openxmlformats.org/officeDocument/2006/relationships" xmlns:p="http://schemas.openxmlformats.org/presentationml/2006/main">
   <p:cSld>
     <p:spTree>
@@ -11158,6 +10750,114 @@
           <p:cNvPr id="2" name="Title 1">
             <a:extLst>
               <a:ext uri="{FF2B5EF4-FFF2-40B4-BE49-F238E27FC236}">
+                <a16:creationId xmlns:a16="http://schemas.microsoft.com/office/drawing/2014/main" id="{BE440928-28C5-1BEB-8E13-6AC181D2E3C9}"/>
+              </a:ext>
+            </a:extLst>
+          </p:cNvPr>
+          <p:cNvSpPr>
+            <a:spLocks noGrp="1"/>
+          </p:cNvSpPr>
+          <p:nvPr>
+            <p:ph type="title"/>
+          </p:nvPr>
+        </p:nvSpPr>
+        <p:spPr/>
+        <p:txBody>
+          <a:bodyPr/>
+          <a:lstStyle/>
+          <a:p>
+            <a:r>
+              <a:rPr lang="en-US" dirty="0"/>
+              <a:t>Overview</a:t>
+            </a:r>
+          </a:p>
+        </p:txBody>
+      </p:sp>
+      <p:sp>
+        <p:nvSpPr>
+          <p:cNvPr id="3" name="Content Placeholder 2">
+            <a:extLst>
+              <a:ext uri="{FF2B5EF4-FFF2-40B4-BE49-F238E27FC236}">
+                <a16:creationId xmlns:a16="http://schemas.microsoft.com/office/drawing/2014/main" id="{79B03794-4D0F-99C0-1C81-5B12609061CE}"/>
+              </a:ext>
+            </a:extLst>
+          </p:cNvPr>
+          <p:cNvSpPr>
+            <a:spLocks noGrp="1"/>
+          </p:cNvSpPr>
+          <p:nvPr>
+            <p:ph idx="1"/>
+          </p:nvPr>
+        </p:nvSpPr>
+        <p:spPr/>
+        <p:txBody>
+          <a:bodyPr/>
+          <a:lstStyle/>
+          <a:p>
+            <a:r>
+              <a:rPr lang="en-US" dirty="0"/>
+              <a:t>Presentation on what </a:t>
+            </a:r>
+            <a:r>
+              <a:rPr lang="en-US" dirty="0" err="1"/>
+              <a:t>MsPASS</a:t>
+            </a:r>
+            <a:r>
+              <a:rPr lang="en-US" dirty="0"/>
+              <a:t> is and why you should use it</a:t>
+            </a:r>
+          </a:p>
+          <a:p>
+            <a:r>
+              <a:rPr lang="en-US" dirty="0"/>
+              <a:t>Hands on session working through </a:t>
+            </a:r>
+            <a:r>
+              <a:rPr lang="en-US" dirty="0" err="1"/>
+              <a:t>jupyter</a:t>
+            </a:r>
+            <a:r>
+              <a:rPr lang="en-US" dirty="0"/>
+              <a:t> notebook</a:t>
+            </a:r>
+          </a:p>
+        </p:txBody>
+      </p:sp>
+    </p:spTree>
+    <p:extLst>
+      <p:ext uri="{BB962C8B-B14F-4D97-AF65-F5344CB8AC3E}">
+        <p14:creationId xmlns:p14="http://schemas.microsoft.com/office/powerpoint/2010/main" val="3552250515"/>
+      </p:ext>
+    </p:extLst>
+  </p:cSld>
+  <p:clrMapOvr>
+    <a:masterClrMapping/>
+  </p:clrMapOvr>
+</p:sld>
+</file>
+
+<file path=ppt/slides/slide20.xml><?xml version="1.0" encoding="utf-8"?>
+<p:sld xmlns:a="http://schemas.openxmlformats.org/drawingml/2006/main" xmlns:r="http://schemas.openxmlformats.org/officeDocument/2006/relationships" xmlns:p="http://schemas.openxmlformats.org/presentationml/2006/main">
+  <p:cSld>
+    <p:spTree>
+      <p:nvGrpSpPr>
+        <p:cNvPr id="1" name=""/>
+        <p:cNvGrpSpPr/>
+        <p:nvPr/>
+      </p:nvGrpSpPr>
+      <p:grpSpPr>
+        <a:xfrm>
+          <a:off x="0" y="0"/>
+          <a:ext cx="0" cy="0"/>
+          <a:chOff x="0" y="0"/>
+          <a:chExt cx="0" cy="0"/>
+        </a:xfrm>
+      </p:grpSpPr>
+      <p:sp>
+        <p:nvSpPr>
+          <p:cNvPr id="2" name="Title 1">
+            <a:extLst>
+              <a:ext uri="{FF2B5EF4-FFF2-40B4-BE49-F238E27FC236}">
                 <a16:creationId xmlns:a16="http://schemas.microsoft.com/office/drawing/2014/main" id="{B2EE8108-FFF7-194B-B381-9A50A8B9319C}"/>
               </a:ext>
             </a:extLst>
@@ -11323,7 +11023,7 @@
 </p:sld>
 </file>
 
-<file path=ppt/slides/slide22.xml><?xml version="1.0" encoding="utf-8"?>
+<file path=ppt/slides/slide21.xml><?xml version="1.0" encoding="utf-8"?>
 <p:sld xmlns:a="http://schemas.openxmlformats.org/drawingml/2006/main" xmlns:r="http://schemas.openxmlformats.org/officeDocument/2006/relationships" xmlns:p="http://schemas.openxmlformats.org/presentationml/2006/main">
   <p:cSld>
     <p:spTree>
@@ -12097,7 +11797,7 @@
         <p:spPr>
           <a:xfrm>
             <a:off x="4533900" y="4223657"/>
-            <a:ext cx="6558643" cy="2062103"/>
+            <a:ext cx="6558643" cy="2554545"/>
           </a:xfrm>
           <a:prstGeom prst="rect">
             <a:avLst/>
@@ -12147,7 +11847,7 @@
                   <a:schemeClr val="bg1"/>
                 </a:solidFill>
               </a:rPr>
-              <a:t>For Seismology – tool for us not computer scientists</a:t>
+              <a:t>For Seismology research – tool for us not computer scientists</a:t>
             </a:r>
           </a:p>
         </p:txBody>
@@ -12618,7 +12318,7 @@
           <p:cNvPr id="2" name="Title 1">
             <a:extLst>
               <a:ext uri="{FF2B5EF4-FFF2-40B4-BE49-F238E27FC236}">
-                <a16:creationId xmlns:a16="http://schemas.microsoft.com/office/drawing/2014/main" id="{79B1D3BE-71BA-0749-8CE5-F74F32F34E39}"/>
+                <a16:creationId xmlns:a16="http://schemas.microsoft.com/office/drawing/2014/main" id="{E4FAF576-B548-B19E-7F5C-9AA2956B74D9}"/>
               </a:ext>
             </a:extLst>
           </p:cNvPr>
@@ -12636,7 +12336,7 @@
           <a:p>
             <a:r>
               <a:rPr lang="en-US" dirty="0"/>
-              <a:t>What is in the box?</a:t>
+              <a:t>Discussion</a:t>
             </a:r>
           </a:p>
         </p:txBody>
@@ -12646,7 +12346,7 @@
           <p:cNvPr id="3" name="Content Placeholder 2">
             <a:extLst>
               <a:ext uri="{FF2B5EF4-FFF2-40B4-BE49-F238E27FC236}">
-                <a16:creationId xmlns:a16="http://schemas.microsoft.com/office/drawing/2014/main" id="{77B91BDE-13EB-9F46-B938-D6E91F437AB2}"/>
+                <a16:creationId xmlns:a16="http://schemas.microsoft.com/office/drawing/2014/main" id="{A6A362C6-397D-89D3-B942-664DD36E89B5}"/>
               </a:ext>
             </a:extLst>
           </p:cNvPr>
@@ -12659,158 +12359,24 @@
         </p:nvSpPr>
         <p:spPr/>
         <p:txBody>
-          <a:bodyPr>
-            <a:normAutofit fontScale="55000" lnSpcReduction="20000"/>
-          </a:bodyPr>
+          <a:bodyPr/>
           <a:lstStyle/>
           <a:p>
             <a:r>
-              <a:rPr lang="en-US" dirty="0"/>
-              <a:t>Exceptionally complete documentation (</a:t>
-            </a:r>
-            <a:r>
-              <a:rPr lang="en-US" dirty="0">
-                <a:hlinkClick r:id="rId2"/>
-              </a:rPr>
-              <a:t>https://mspass.org</a:t>
-            </a:r>
-            <a:r>
-              <a:rPr lang="en-US" dirty="0"/>
-              <a:t> ) for open-source package</a:t>
-            </a:r>
-          </a:p>
-          <a:p>
-            <a:r>
-              <a:rPr lang="en-US" dirty="0"/>
-              <a:t>Database to manage large data sets</a:t>
-            </a:r>
-          </a:p>
-          <a:p>
-            <a:r>
-              <a:rPr lang="en-US" dirty="0"/>
-              <a:t>Parallel processing</a:t>
-            </a:r>
-          </a:p>
-          <a:p>
-            <a:pPr lvl="1"/>
-            <a:r>
-              <a:rPr lang="en-US" dirty="0"/>
-              <a:t>HPC or cloud functionality</a:t>
-            </a:r>
-          </a:p>
-          <a:p>
-            <a:pPr lvl="1"/>
-            <a:r>
-              <a:rPr lang="en-US" dirty="0"/>
-              <a:t>Clean error handling for long running jobs</a:t>
-            </a:r>
-          </a:p>
-          <a:p>
-            <a:r>
-              <a:rPr lang="en-US" dirty="0"/>
-              <a:t>Flexible but simple  to use IO abstractions (read-write almost any format and from URL)</a:t>
-            </a:r>
-          </a:p>
-          <a:p>
-            <a:r>
-              <a:rPr lang="en-US" dirty="0"/>
-              <a:t>Python job control language</a:t>
-            </a:r>
-          </a:p>
-          <a:p>
-            <a:r>
-              <a:rPr lang="en-US" dirty="0"/>
-              <a:t>Algorithms – low level preprocessing (solved problem) focus</a:t>
-            </a:r>
-          </a:p>
-          <a:p>
-            <a:pPr lvl="1"/>
-            <a:r>
-              <a:rPr lang="en-US" dirty="0"/>
-              <a:t>All </a:t>
-            </a:r>
-            <a:r>
               <a:rPr lang="en-US" dirty="0" err="1"/>
-              <a:t>obspy</a:t>
-            </a:r>
-            <a:r>
-              <a:rPr lang="en-US" dirty="0"/>
-              <a:t> signal processing algorithms</a:t>
-            </a:r>
-          </a:p>
-          <a:p>
-            <a:pPr lvl="1"/>
-            <a:r>
-              <a:rPr lang="en-US" dirty="0"/>
-              <a:t>Low-level windowing, bundling, and similar grungy stuff</a:t>
-            </a:r>
-          </a:p>
-          <a:p>
-            <a:pPr lvl="1"/>
-            <a:r>
-              <a:rPr lang="en-US" dirty="0"/>
-              <a:t>Three-component primitives (rotation and transformation)</a:t>
-            </a:r>
-          </a:p>
-          <a:p>
-            <a:pPr lvl="1"/>
-            <a:r>
-              <a:rPr lang="en-US" dirty="0"/>
-              <a:t>Trace </a:t>
-            </a:r>
-            <a:r>
-              <a:rPr lang="en-US" dirty="0" err="1"/>
-              <a:t>editng</a:t>
-            </a:r>
-            <a:endParaRPr lang="en-US" dirty="0"/>
-          </a:p>
-          <a:p>
-            <a:pPr lvl="1"/>
-            <a:r>
-              <a:rPr lang="en-US" dirty="0"/>
-              <a:t>Header math</a:t>
-            </a:r>
-          </a:p>
-          <a:p>
-            <a:pPr lvl="1"/>
-            <a:r>
-              <a:rPr lang="en-US" dirty="0"/>
-              <a:t>SNR calculations </a:t>
-            </a:r>
-          </a:p>
-          <a:p>
-            <a:pPr lvl="1"/>
-            <a:r>
-              <a:rPr lang="en-US" dirty="0"/>
-              <a:t>All common P receiver function  </a:t>
-            </a:r>
-            <a:r>
-              <a:rPr lang="en-US" dirty="0" err="1"/>
-              <a:t>deconvolution+novel</a:t>
-            </a:r>
-            <a:r>
-              <a:rPr lang="en-US" dirty="0"/>
-              <a:t> new method</a:t>
-            </a:r>
-          </a:p>
-          <a:p>
-            <a:r>
-              <a:rPr lang="en-US" dirty="0"/>
-              <a:t>Docker container or anaconda package distribution</a:t>
-            </a:r>
-          </a:p>
-          <a:p>
-            <a:endParaRPr lang="en-US" dirty="0"/>
-          </a:p>
-          <a:p>
-            <a:endParaRPr lang="en-US" dirty="0"/>
+              <a:t>MsPASS</a:t>
+            </a:r>
+            <a:r>
+              <a:rPr lang="en-US" dirty="0"/>
+              <a:t> is a framework for research computing.   What does the “research” keyword mean in this context?</a:t>
+            </a:r>
           </a:p>
         </p:txBody>
       </p:sp>
     </p:spTree>
     <p:extLst>
       <p:ext uri="{BB962C8B-B14F-4D97-AF65-F5344CB8AC3E}">
-        <p14:creationId xmlns:p14="http://schemas.microsoft.com/office/powerpoint/2010/main" val="472050597"/>
+        <p14:creationId xmlns:p14="http://schemas.microsoft.com/office/powerpoint/2010/main" val="126902777"/>
       </p:ext>
     </p:extLst>
   </p:cSld>
@@ -12842,7 +12408,7 @@
           <p:cNvPr id="2" name="Title 1">
             <a:extLst>
               <a:ext uri="{FF2B5EF4-FFF2-40B4-BE49-F238E27FC236}">
-                <a16:creationId xmlns:a16="http://schemas.microsoft.com/office/drawing/2014/main" id="{EE66C244-A0C9-2303-7754-806CA7975E73}"/>
+                <a16:creationId xmlns:a16="http://schemas.microsoft.com/office/drawing/2014/main" id="{134510BD-7BF3-4542-F66C-6A18A8B5F307}"/>
               </a:ext>
             </a:extLst>
           </p:cNvPr>
@@ -12860,15 +12426,78 @@
           <a:p>
             <a:r>
               <a:rPr lang="en-US" dirty="0"/>
-              <a:t>What is </a:t>
-            </a:r>
-            <a:r>
-              <a:rPr lang="en-US" dirty="0" err="1"/>
-              <a:t>MsPASS</a:t>
-            </a:r>
-            <a:r>
-              <a:rPr lang="en-US" dirty="0"/>
-              <a:t> good for</a:t>
+              <a:t>Production versus Research IT systems</a:t>
+            </a:r>
+          </a:p>
+        </p:txBody>
+      </p:sp>
+      <p:sp>
+        <p:nvSpPr>
+          <p:cNvPr id="3" name="Content Placeholder 2">
+            <a:extLst>
+              <a:ext uri="{FF2B5EF4-FFF2-40B4-BE49-F238E27FC236}">
+                <a16:creationId xmlns:a16="http://schemas.microsoft.com/office/drawing/2014/main" id="{618D0A6C-581C-093E-9CB5-21FCB6FDCB17}"/>
+              </a:ext>
+            </a:extLst>
+          </p:cNvPr>
+          <p:cNvSpPr>
+            <a:spLocks noGrp="1"/>
+          </p:cNvSpPr>
+          <p:nvPr>
+            <p:ph sz="half" idx="1"/>
+          </p:nvPr>
+        </p:nvSpPr>
+        <p:spPr/>
+        <p:txBody>
+          <a:bodyPr>
+            <a:normAutofit fontScale="92500"/>
+          </a:bodyPr>
+          <a:lstStyle/>
+          <a:p>
+            <a:pPr marL="0" indent="0">
+              <a:buNone/>
+            </a:pPr>
+            <a:r>
+              <a:rPr lang="en-US" i="1" u="sng" dirty="0"/>
+              <a:t>Production</a:t>
+            </a:r>
+          </a:p>
+          <a:p>
+            <a:r>
+              <a:rPr lang="en-US" dirty="0"/>
+              <a:t>Solves Specific Problem</a:t>
+            </a:r>
+          </a:p>
+          <a:p>
+            <a:r>
+              <a:rPr lang="en-US" dirty="0"/>
+              <a:t>Performance is critical</a:t>
+            </a:r>
+          </a:p>
+          <a:p>
+            <a:pPr lvl="1"/>
+            <a:r>
+              <a:rPr lang="en-US" dirty="0"/>
+              <a:t>Time is money</a:t>
+            </a:r>
+          </a:p>
+          <a:p>
+            <a:pPr lvl="1"/>
+            <a:r>
+              <a:rPr lang="en-US" dirty="0"/>
+              <a:t>Mission critical role with repeating tasks</a:t>
+            </a:r>
+          </a:p>
+          <a:p>
+            <a:r>
+              <a:rPr lang="en-US" dirty="0"/>
+              <a:t>Operable with minimum skill set necessary for job</a:t>
+            </a:r>
+          </a:p>
+          <a:p>
+            <a:r>
+              <a:rPr lang="en-US" dirty="0"/>
+              <a:t>Data model well known and fixed</a:t>
             </a:r>
           </a:p>
         </p:txBody>
@@ -12878,7 +12507,7 @@
           <p:cNvPr id="4" name="Content Placeholder 3">
             <a:extLst>
               <a:ext uri="{FF2B5EF4-FFF2-40B4-BE49-F238E27FC236}">
-                <a16:creationId xmlns:a16="http://schemas.microsoft.com/office/drawing/2014/main" id="{A9DFD17A-D48A-6B72-6030-AB2A68D68DBE}"/>
+                <a16:creationId xmlns:a16="http://schemas.microsoft.com/office/drawing/2014/main" id="{C77F07C0-7492-A32E-C511-061340E47C0A}"/>
               </a:ext>
             </a:extLst>
           </p:cNvPr>
@@ -12886,63 +12515,68 @@
             <a:spLocks noGrp="1"/>
           </p:cNvSpPr>
           <p:nvPr>
-            <p:ph idx="1"/>
+            <p:ph sz="half" idx="2"/>
           </p:nvPr>
         </p:nvSpPr>
         <p:spPr/>
         <p:txBody>
-          <a:bodyPr/>
+          <a:bodyPr>
+            <a:normAutofit fontScale="92500"/>
+          </a:bodyPr>
           <a:lstStyle/>
           <a:p>
-            <a:r>
-              <a:rPr lang="en-US" dirty="0"/>
-              <a:t>Generic waveform processing toolkit</a:t>
-            </a:r>
-          </a:p>
-          <a:p>
-            <a:r>
-              <a:rPr lang="en-US" dirty="0"/>
-              <a:t>Scalability</a:t>
+            <a:pPr marL="0" indent="0">
+              <a:buNone/>
+            </a:pPr>
+            <a:r>
+              <a:rPr lang="en-US" i="1" u="sng" dirty="0"/>
+              <a:t>Research</a:t>
+            </a:r>
+          </a:p>
+          <a:p>
+            <a:r>
+              <a:rPr lang="en-US" dirty="0"/>
+              <a:t>Handle range of problems </a:t>
+            </a:r>
+          </a:p>
+          <a:p>
+            <a:r>
+              <a:rPr lang="en-US" dirty="0"/>
+              <a:t>Performance is secondary</a:t>
             </a:r>
           </a:p>
           <a:p>
             <a:pPr lvl="1"/>
             <a:r>
               <a:rPr lang="en-US" dirty="0"/>
-              <a:t>Prototype on a desktop</a:t>
+              <a:t>Feasible sufficient</a:t>
             </a:r>
           </a:p>
           <a:p>
             <a:pPr lvl="1"/>
             <a:r>
               <a:rPr lang="en-US" dirty="0"/>
-              <a:t>If needed scale up to HPC  or cloud</a:t>
-            </a:r>
-          </a:p>
-          <a:p>
-            <a:pPr lvl="1"/>
-            <a:r>
-              <a:rPr lang="en-US" dirty="0"/>
-              <a:t>Likely to become the tool of choice for interacting with </a:t>
-            </a:r>
-            <a:r>
-              <a:rPr lang="en-US" dirty="0" err="1"/>
-              <a:t>Earthscope</a:t>
-            </a:r>
-            <a:r>
-              <a:rPr lang="en-US" dirty="0"/>
-              <a:t> DMC when they get their cloud system working</a:t>
-            </a:r>
-          </a:p>
-          <a:p>
-            <a:endParaRPr lang="en-US" dirty="0"/>
+              <a:t>Many one-up solutions</a:t>
+            </a:r>
+          </a:p>
+          <a:p>
+            <a:r>
+              <a:rPr lang="en-US" dirty="0"/>
+              <a:t>Can assume users are specialists and life-long learners</a:t>
+            </a:r>
+          </a:p>
+          <a:p>
+            <a:r>
+              <a:rPr lang="en-US" dirty="0"/>
+              <a:t>Data highly variable (one person’s signal is another’s noise)</a:t>
+            </a:r>
           </a:p>
         </p:txBody>
       </p:sp>
     </p:spTree>
     <p:extLst>
       <p:ext uri="{BB962C8B-B14F-4D97-AF65-F5344CB8AC3E}">
-        <p14:creationId xmlns:p14="http://schemas.microsoft.com/office/powerpoint/2010/main" val="3514225822"/>
+        <p14:creationId xmlns:p14="http://schemas.microsoft.com/office/powerpoint/2010/main" val="2242568584"/>
       </p:ext>
     </p:extLst>
   </p:cSld>
@@ -12971,10 +12605,10 @@
       </p:grpSpPr>
       <p:sp>
         <p:nvSpPr>
-          <p:cNvPr id="2" name="Title 1">
+          <p:cNvPr id="5" name="Title 4">
             <a:extLst>
               <a:ext uri="{FF2B5EF4-FFF2-40B4-BE49-F238E27FC236}">
-                <a16:creationId xmlns:a16="http://schemas.microsoft.com/office/drawing/2014/main" id="{25C07852-A7DD-2E70-1862-76FE73ACAA68}"/>
+                <a16:creationId xmlns:a16="http://schemas.microsoft.com/office/drawing/2014/main" id="{84CA6C25-7724-8B0D-E985-9B1FD3EB1547}"/>
               </a:ext>
             </a:extLst>
           </p:cNvPr>
@@ -12992,17 +12626,25 @@
           <a:p>
             <a:r>
               <a:rPr lang="en-US" dirty="0"/>
-              <a:t>Sermonette/Sales Pitch</a:t>
-            </a:r>
-          </a:p>
-        </p:txBody>
-      </p:sp>
-      <p:sp>
-        <p:nvSpPr>
-          <p:cNvPr id="3" name="Content Placeholder 2">
+              <a:t>Key Roles </a:t>
+            </a:r>
+            <a:r>
+              <a:rPr lang="en-US" dirty="0" err="1"/>
+              <a:t>MsPASS</a:t>
+            </a:r>
+            <a:r>
+              <a:rPr lang="en-US" dirty="0"/>
+              <a:t> can play in research today</a:t>
+            </a:r>
+          </a:p>
+        </p:txBody>
+      </p:sp>
+      <p:sp>
+        <p:nvSpPr>
+          <p:cNvPr id="6" name="Content Placeholder 5">
             <a:extLst>
               <a:ext uri="{FF2B5EF4-FFF2-40B4-BE49-F238E27FC236}">
-                <a16:creationId xmlns:a16="http://schemas.microsoft.com/office/drawing/2014/main" id="{40F2B149-0D77-D08B-DB15-456B2B3ECB78}"/>
+                <a16:creationId xmlns:a16="http://schemas.microsoft.com/office/drawing/2014/main" id="{0AE10C19-B2B5-CED9-9CE7-C3D4FC5D96FE}"/>
               </a:ext>
             </a:extLst>
           </p:cNvPr>
@@ -13020,114 +12662,232 @@
           <a:p>
             <a:r>
               <a:rPr lang="en-US" dirty="0"/>
-              <a:t>This community needs to recognize what we have given you</a:t>
-            </a:r>
-          </a:p>
-          <a:p>
-            <a:r>
-              <a:rPr lang="en-US" dirty="0" err="1"/>
-              <a:t>MsPASS</a:t>
-            </a:r>
-            <a:r>
-              <a:rPr lang="en-US" dirty="0"/>
-              <a:t> makes archaic</a:t>
-            </a:r>
-          </a:p>
-          <a:p>
-            <a:pPr lvl="1"/>
-            <a:r>
-              <a:rPr lang="en-US" dirty="0"/>
-              <a:t>SAC</a:t>
-            </a:r>
-          </a:p>
-          <a:p>
-            <a:pPr lvl="1"/>
-            <a:r>
-              <a:rPr lang="en-US" dirty="0"/>
-              <a:t>AH</a:t>
-            </a:r>
-          </a:p>
-          <a:p>
-            <a:pPr lvl="1"/>
-            <a:r>
-              <a:rPr lang="en-US" dirty="0"/>
-              <a:t>Most, if not all, existing generic waveform handling tools</a:t>
-            </a:r>
-          </a:p>
-          <a:p>
-            <a:r>
-              <a:rPr lang="en-US" dirty="0" err="1"/>
-              <a:t>MsPASS</a:t>
-            </a:r>
-            <a:r>
-              <a:rPr lang="en-US" dirty="0"/>
-              <a:t> </a:t>
-            </a:r>
-            <a:r>
-              <a:rPr lang="en-US" dirty="0" err="1"/>
-              <a:t>supercedes</a:t>
-            </a:r>
-            <a:r>
-              <a:rPr lang="en-US" dirty="0"/>
-              <a:t> </a:t>
-            </a:r>
-            <a:r>
-              <a:rPr lang="en-US" dirty="0" err="1"/>
-              <a:t>ObsPy</a:t>
-            </a:r>
-            <a:endParaRPr lang="en-US" dirty="0"/>
-          </a:p>
-          <a:p>
-            <a:pPr lvl="1"/>
-            <a:r>
-              <a:rPr lang="en-US" dirty="0"/>
-              <a:t>If you use </a:t>
-            </a:r>
-            <a:r>
-              <a:rPr lang="en-US" dirty="0" err="1"/>
-              <a:t>ObsPy</a:t>
-            </a:r>
-            <a:r>
-              <a:rPr lang="en-US" dirty="0"/>
-              <a:t> you can use </a:t>
-            </a:r>
-            <a:r>
-              <a:rPr lang="en-US" dirty="0" err="1"/>
-              <a:t>MsPASS</a:t>
-            </a:r>
-            <a:r>
-              <a:rPr lang="en-US" dirty="0"/>
-              <a:t> with minimal effort</a:t>
-            </a:r>
-          </a:p>
-          <a:p>
-            <a:pPr lvl="1"/>
-            <a:r>
-              <a:rPr lang="en-US" dirty="0"/>
-              <a:t>Drastically increases functionality over </a:t>
-            </a:r>
-            <a:r>
-              <a:rPr lang="en-US" dirty="0" err="1"/>
-              <a:t>ObsPy</a:t>
-            </a:r>
-            <a:endParaRPr lang="en-US" dirty="0"/>
-          </a:p>
-          <a:p>
-            <a:pPr lvl="1"/>
-            <a:endParaRPr lang="en-US" dirty="0"/>
-          </a:p>
-        </p:txBody>
-      </p:sp>
+              <a:t>Manage large data sets </a:t>
+            </a:r>
+          </a:p>
+          <a:p>
+            <a:r>
+              <a:rPr lang="en-US" dirty="0"/>
+              <a:t>Tools for low-level work to assemble event-based data</a:t>
+            </a:r>
+          </a:p>
+          <a:p>
+            <a:r>
+              <a:rPr lang="en-US" dirty="0"/>
+              <a:t>Generic parallel tools for handling continuous data</a:t>
+            </a:r>
+          </a:p>
+          <a:p>
+            <a:r>
+              <a:rPr lang="en-US" dirty="0"/>
+              <a:t>Complete set of tools for P-wave receiver function processing</a:t>
+            </a:r>
+          </a:p>
+          <a:p>
+            <a:r>
+              <a:rPr lang="en-US" dirty="0"/>
+              <a:t>Tools for spectral estimation</a:t>
+            </a:r>
+          </a:p>
+        </p:txBody>
+      </p:sp>
+      <p:grpSp>
+        <p:nvGrpSpPr>
+          <p:cNvPr id="9" name="Group 8">
+            <a:extLst>
+              <a:ext uri="{FF2B5EF4-FFF2-40B4-BE49-F238E27FC236}">
+                <a16:creationId xmlns:a16="http://schemas.microsoft.com/office/drawing/2014/main" id="{AE1235E6-FEA4-FEB0-904D-19E360EBD4D0}"/>
+              </a:ext>
+            </a:extLst>
+          </p:cNvPr>
+          <p:cNvGrpSpPr/>
+          <p:nvPr/>
+        </p:nvGrpSpPr>
+        <p:grpSpPr>
+          <a:xfrm>
+            <a:off x="471488" y="2336873"/>
+            <a:ext cx="11617731" cy="949252"/>
+            <a:chOff x="471488" y="2336873"/>
+            <a:chExt cx="11617731" cy="949252"/>
+          </a:xfrm>
+        </p:grpSpPr>
+        <p:sp>
+          <p:nvSpPr>
+            <p:cNvPr id="7" name="Rectangle 6">
+              <a:extLst>
+                <a:ext uri="{FF2B5EF4-FFF2-40B4-BE49-F238E27FC236}">
+                  <a16:creationId xmlns:a16="http://schemas.microsoft.com/office/drawing/2014/main" id="{C8FB345D-E4B0-C57B-A178-4539F4E76E30}"/>
+                </a:ext>
+              </a:extLst>
+            </p:cNvPr>
+            <p:cNvSpPr/>
+            <p:nvPr/>
+          </p:nvSpPr>
+          <p:spPr>
+            <a:xfrm>
+              <a:off x="471488" y="2336873"/>
+              <a:ext cx="8801100" cy="949252"/>
+            </a:xfrm>
+            <a:prstGeom prst="rect">
+              <a:avLst/>
+            </a:prstGeom>
+            <a:noFill/>
+            <a:ln w="76200">
+              <a:solidFill>
+                <a:srgbClr val="FFFF00"/>
+              </a:solidFill>
+            </a:ln>
+          </p:spPr>
+          <p:style>
+            <a:lnRef idx="2">
+              <a:schemeClr val="accent1">
+                <a:shade val="15000"/>
+              </a:schemeClr>
+            </a:lnRef>
+            <a:fillRef idx="1">
+              <a:schemeClr val="accent1"/>
+            </a:fillRef>
+            <a:effectRef idx="0">
+              <a:schemeClr val="accent1"/>
+            </a:effectRef>
+            <a:fontRef idx="minor">
+              <a:schemeClr val="lt1"/>
+            </a:fontRef>
+          </p:style>
+          <p:txBody>
+            <a:bodyPr rtlCol="0" anchor="ctr"/>
+            <a:lstStyle/>
+            <a:p>
+              <a:pPr algn="ctr"/>
+              <a:endParaRPr lang="en-US"/>
+            </a:p>
+          </p:txBody>
+        </p:sp>
+        <p:sp>
+          <p:nvSpPr>
+            <p:cNvPr id="8" name="TextBox 7">
+              <a:extLst>
+                <a:ext uri="{FF2B5EF4-FFF2-40B4-BE49-F238E27FC236}">
+                  <a16:creationId xmlns:a16="http://schemas.microsoft.com/office/drawing/2014/main" id="{99685190-5D41-1918-A5F1-D5CCA4623A87}"/>
+                </a:ext>
+              </a:extLst>
+            </p:cNvPr>
+            <p:cNvSpPr txBox="1"/>
+            <p:nvPr/>
+          </p:nvSpPr>
+          <p:spPr>
+            <a:xfrm>
+              <a:off x="9569302" y="2466753"/>
+              <a:ext cx="2519917" cy="707886"/>
+            </a:xfrm>
+            <a:prstGeom prst="rect">
+              <a:avLst/>
+            </a:prstGeom>
+            <a:noFill/>
+          </p:spPr>
+          <p:txBody>
+            <a:bodyPr wrap="square" rtlCol="0">
+              <a:spAutoFit/>
+            </a:bodyPr>
+            <a:lstStyle/>
+            <a:p>
+              <a:r>
+                <a:rPr lang="en-US" sz="2000" dirty="0">
+                  <a:solidFill>
+                    <a:srgbClr val="FFFF00"/>
+                  </a:solidFill>
+                </a:rPr>
+                <a:t>Hands on exercise focus</a:t>
+              </a:r>
+            </a:p>
+          </p:txBody>
+        </p:sp>
+      </p:grpSp>
     </p:spTree>
     <p:extLst>
       <p:ext uri="{BB962C8B-B14F-4D97-AF65-F5344CB8AC3E}">
-        <p14:creationId xmlns:p14="http://schemas.microsoft.com/office/powerpoint/2010/main" val="2540436878"/>
+        <p14:creationId xmlns:p14="http://schemas.microsoft.com/office/powerpoint/2010/main" val="2362095333"/>
       </p:ext>
     </p:extLst>
   </p:cSld>
   <p:clrMapOvr>
     <a:masterClrMapping/>
   </p:clrMapOvr>
+  <p:timing>
+    <p:tnLst>
+      <p:par>
+        <p:cTn id="1" dur="indefinite" restart="never" nodeType="tmRoot">
+          <p:childTnLst>
+            <p:seq concurrent="1" nextAc="seek">
+              <p:cTn id="2" dur="indefinite" nodeType="mainSeq">
+                <p:childTnLst>
+                  <p:par>
+                    <p:cTn id="3" fill="hold">
+                      <p:stCondLst>
+                        <p:cond delay="indefinite"/>
+                      </p:stCondLst>
+                      <p:childTnLst>
+                        <p:par>
+                          <p:cTn id="4" fill="hold">
+                            <p:stCondLst>
+                              <p:cond delay="0"/>
+                            </p:stCondLst>
+                            <p:childTnLst>
+                              <p:par>
+                                <p:cTn id="5" presetID="1" presetClass="entr" presetSubtype="0" fill="hold" nodeType="clickEffect">
+                                  <p:stCondLst>
+                                    <p:cond delay="0"/>
+                                  </p:stCondLst>
+                                  <p:childTnLst>
+                                    <p:set>
+                                      <p:cBhvr>
+                                        <p:cTn id="6" dur="1" fill="hold">
+                                          <p:stCondLst>
+                                            <p:cond delay="0"/>
+                                          </p:stCondLst>
+                                        </p:cTn>
+                                        <p:tgtEl>
+                                          <p:spTgt spid="9"/>
+                                        </p:tgtEl>
+                                        <p:attrNameLst>
+                                          <p:attrName>style.visibility</p:attrName>
+                                        </p:attrNameLst>
+                                      </p:cBhvr>
+                                      <p:to>
+                                        <p:strVal val="visible"/>
+                                      </p:to>
+                                    </p:set>
+                                  </p:childTnLst>
+                                </p:cTn>
+                              </p:par>
+                            </p:childTnLst>
+                          </p:cTn>
+                        </p:par>
+                      </p:childTnLst>
+                    </p:cTn>
+                  </p:par>
+                </p:childTnLst>
+              </p:cTn>
+              <p:prevCondLst>
+                <p:cond evt="onPrev" delay="0">
+                  <p:tgtEl>
+                    <p:sldTgt/>
+                  </p:tgtEl>
+                </p:cond>
+              </p:prevCondLst>
+              <p:nextCondLst>
+                <p:cond evt="onNext" delay="0">
+                  <p:tgtEl>
+                    <p:sldTgt/>
+                  </p:tgtEl>
+                </p:cond>
+              </p:nextCondLst>
+            </p:seq>
+          </p:childTnLst>
+        </p:cTn>
+      </p:par>
+    </p:tnLst>
+  </p:timing>
 </p:sld>
 </file>
 
@@ -13153,7 +12913,7 @@
           <p:cNvPr id="2" name="Title 1">
             <a:extLst>
               <a:ext uri="{FF2B5EF4-FFF2-40B4-BE49-F238E27FC236}">
-                <a16:creationId xmlns:a16="http://schemas.microsoft.com/office/drawing/2014/main" id="{90EBD850-3554-2200-EB33-F6515972CE5F}"/>
+                <a16:creationId xmlns:a16="http://schemas.microsoft.com/office/drawing/2014/main" id="{EE66C244-A0C9-2303-7754-806CA7975E73}"/>
               </a:ext>
             </a:extLst>
           </p:cNvPr>
@@ -13171,15 +12931,7 @@
           <a:p>
             <a:r>
               <a:rPr lang="en-US" dirty="0"/>
-              <a:t>I know </a:t>
-            </a:r>
-            <a:r>
-              <a:rPr lang="en-US" dirty="0" err="1"/>
-              <a:t>ObsPy</a:t>
-            </a:r>
-            <a:r>
-              <a:rPr lang="en-US" dirty="0"/>
-              <a:t> well, why should I move to </a:t>
+              <a:t>What is </a:t>
             </a:r>
             <a:r>
               <a:rPr lang="en-US" dirty="0" err="1"/>
@@ -13187,17 +12939,17 @@
             </a:r>
             <a:r>
               <a:rPr lang="en-US" dirty="0"/>
-              <a:t>?</a:t>
-            </a:r>
-          </a:p>
-        </p:txBody>
-      </p:sp>
-      <p:sp>
-        <p:nvSpPr>
-          <p:cNvPr id="3" name="Content Placeholder 2">
+              <a:t> good for</a:t>
+            </a:r>
+          </a:p>
+        </p:txBody>
+      </p:sp>
+      <p:sp>
+        <p:nvSpPr>
+          <p:cNvPr id="4" name="Content Placeholder 3">
             <a:extLst>
               <a:ext uri="{FF2B5EF4-FFF2-40B4-BE49-F238E27FC236}">
-                <a16:creationId xmlns:a16="http://schemas.microsoft.com/office/drawing/2014/main" id="{5C937B2F-9146-1595-63B2-E2547A425738}"/>
+                <a16:creationId xmlns:a16="http://schemas.microsoft.com/office/drawing/2014/main" id="{A9DFD17A-D48A-6B72-6030-AB2A68D68DBE}"/>
               </a:ext>
             </a:extLst>
           </p:cNvPr>
@@ -13210,62 +12962,39 @@
         </p:nvSpPr>
         <p:spPr/>
         <p:txBody>
-          <a:bodyPr>
-            <a:normAutofit lnSpcReduction="10000"/>
-          </a:bodyPr>
+          <a:bodyPr/>
           <a:lstStyle/>
           <a:p>
             <a:r>
               <a:rPr lang="en-US" dirty="0"/>
-              <a:t>If you are only working with 10000 or less waveforms at a time it won’t help</a:t>
-            </a:r>
-          </a:p>
-          <a:p>
-            <a:r>
-              <a:rPr lang="en-US" dirty="0"/>
-              <a:t>For large data sets</a:t>
+              <a:t>Generic waveform processing toolkit</a:t>
+            </a:r>
+          </a:p>
+          <a:p>
+            <a:r>
+              <a:rPr lang="en-US" dirty="0"/>
+              <a:t>Scalability</a:t>
             </a:r>
           </a:p>
           <a:p>
             <a:pPr lvl="1"/>
             <a:r>
               <a:rPr lang="en-US" dirty="0"/>
-              <a:t>Integrated database for data management essential</a:t>
+              <a:t>Prototype on a desktop</a:t>
             </a:r>
           </a:p>
           <a:p>
             <a:pPr lvl="1"/>
             <a:r>
               <a:rPr lang="en-US" dirty="0"/>
-              <a:t>Clean error handling to run large jobs running for hours</a:t>
+              <a:t>If needed scale up to HPC  or cloud</a:t>
             </a:r>
           </a:p>
           <a:p>
             <a:pPr lvl="1"/>
             <a:r>
               <a:rPr lang="en-US" dirty="0"/>
-              <a:t>Parallel processing functionality</a:t>
-            </a:r>
-          </a:p>
-          <a:p>
-            <a:pPr lvl="1"/>
-            <a:r>
-              <a:rPr lang="en-US" dirty="0"/>
-              <a:t>Cross-platform </a:t>
-            </a:r>
-            <a:r>
-              <a:rPr lang="en-US" dirty="0" err="1"/>
-              <a:t>compability</a:t>
-            </a:r>
-            <a:r>
-              <a:rPr lang="en-US" dirty="0"/>
-              <a:t> – runs on desktop to highest end supercomputer or cloud system</a:t>
-            </a:r>
-          </a:p>
-          <a:p>
-            <a:r>
-              <a:rPr lang="en-US" dirty="0"/>
-              <a:t>Likely to become the standard for low-level interaction with new </a:t>
+              <a:t>Likely to become the tool of choice for interacting with </a:t>
             </a:r>
             <a:r>
               <a:rPr lang="en-US" dirty="0" err="1"/>
@@ -13273,15 +13002,40 @@
             </a:r>
             <a:r>
               <a:rPr lang="en-US" dirty="0"/>
-              <a:t> cloud system</a:t>
-            </a:r>
+              <a:t> DMC when they get their cloud system working</a:t>
+            </a:r>
+          </a:p>
+          <a:p>
+            <a:r>
+              <a:rPr lang="en-US" dirty="0"/>
+              <a:t>With new </a:t>
+            </a:r>
+            <a:r>
+              <a:rPr lang="en-US" dirty="0" err="1"/>
+              <a:t>Earthscope</a:t>
+            </a:r>
+            <a:r>
+              <a:rPr lang="en-US" dirty="0"/>
+              <a:t> system your </a:t>
+            </a:r>
+            <a:r>
+              <a:rPr lang="en-US" dirty="0" err="1"/>
+              <a:t>MsPASS</a:t>
+            </a:r>
+            <a:r>
+              <a:rPr lang="en-US" dirty="0"/>
+              <a:t> notebook will allow reproducing at least the low-level preprocessing to assemble your dataset</a:t>
+            </a:r>
+          </a:p>
+          <a:p>
+            <a:endParaRPr lang="en-US" dirty="0"/>
           </a:p>
         </p:txBody>
       </p:sp>
     </p:spTree>
     <p:extLst>
       <p:ext uri="{BB962C8B-B14F-4D97-AF65-F5344CB8AC3E}">
-        <p14:creationId xmlns:p14="http://schemas.microsoft.com/office/powerpoint/2010/main" val="1310016951"/>
+        <p14:creationId xmlns:p14="http://schemas.microsoft.com/office/powerpoint/2010/main" val="3514225822"/>
       </p:ext>
     </p:extLst>
   </p:cSld>
@@ -13313,7 +13067,7 @@
           <p:cNvPr id="2" name="Title 1">
             <a:extLst>
               <a:ext uri="{FF2B5EF4-FFF2-40B4-BE49-F238E27FC236}">
-                <a16:creationId xmlns:a16="http://schemas.microsoft.com/office/drawing/2014/main" id="{220D7C87-14C1-7FBA-03A5-36189029A249}"/>
+                <a16:creationId xmlns:a16="http://schemas.microsoft.com/office/drawing/2014/main" id="{79B1D3BE-71BA-0749-8CE5-F74F32F34E39}"/>
               </a:ext>
             </a:extLst>
           </p:cNvPr>
@@ -13331,13 +13085,8 @@
           <a:p>
             <a:r>
               <a:rPr lang="en-US" dirty="0"/>
-              <a:t>One-liner perspectives on </a:t>
-            </a:r>
-            <a:r>
-              <a:rPr lang="en-US" dirty="0" err="1"/>
-              <a:t>MsPASS</a:t>
-            </a:r>
-            <a:endParaRPr lang="en-US" dirty="0"/>
+              <a:t>What is in the box?</a:t>
+            </a:r>
           </a:p>
         </p:txBody>
       </p:sp>
@@ -13346,7 +13095,7 @@
           <p:cNvPr id="3" name="Content Placeholder 2">
             <a:extLst>
               <a:ext uri="{FF2B5EF4-FFF2-40B4-BE49-F238E27FC236}">
-                <a16:creationId xmlns:a16="http://schemas.microsoft.com/office/drawing/2014/main" id="{D065C900-457C-62AF-AF4A-71B76FC46C2A}"/>
+                <a16:creationId xmlns:a16="http://schemas.microsoft.com/office/drawing/2014/main" id="{77B91BDE-13EB-9F46-B938-D6E91F437AB2}"/>
               </a:ext>
             </a:extLst>
           </p:cNvPr>
@@ -13357,62 +13106,169 @@
             <p:ph idx="1"/>
           </p:nvPr>
         </p:nvSpPr>
-        <p:spPr/>
+        <p:spPr>
+          <a:xfrm>
+            <a:off x="680321" y="2336873"/>
+            <a:ext cx="10510193" cy="4390498"/>
+          </a:xfrm>
+        </p:spPr>
         <p:txBody>
           <a:bodyPr>
-            <a:normAutofit fontScale="92500"/>
+            <a:normAutofit fontScale="55000" lnSpcReduction="20000"/>
           </a:bodyPr>
           <a:lstStyle/>
           <a:p>
             <a:r>
-              <a:rPr lang="en-US" dirty="0"/>
-              <a:t>Only open-source, generic system today for large-scale parallel processing of seismology data</a:t>
-            </a:r>
-          </a:p>
-          <a:p>
-            <a:r>
-              <a:rPr lang="en-US" dirty="0"/>
-              <a:t>Only open-source, generic solution today suitable for cloud computing</a:t>
-            </a:r>
-          </a:p>
-          <a:p>
-            <a:r>
-              <a:rPr lang="en-US" dirty="0" err="1"/>
-              <a:t>ObsPy</a:t>
-            </a:r>
-            <a:r>
-              <a:rPr lang="en-US" dirty="0"/>
-              <a:t> on steroids</a:t>
-            </a:r>
-          </a:p>
-          <a:p>
-            <a:r>
-              <a:rPr lang="en-US" dirty="0"/>
-              <a:t>Runs on almost any system</a:t>
-            </a:r>
-          </a:p>
-          <a:p>
-            <a:r>
-              <a:rPr lang="en-US" dirty="0"/>
-              <a:t>Written by a pair of geeky seismologists for seismologists</a:t>
-            </a:r>
-          </a:p>
-          <a:p>
-            <a:r>
-              <a:rPr lang="en-US" dirty="0"/>
-              <a:t>Now a very stable package</a:t>
-            </a:r>
-          </a:p>
-          <a:p>
-            <a:r>
-              <a:rPr lang="en-US" dirty="0"/>
-              <a:t>Documentation written by seismologists who happen to also be the main developers</a:t>
-            </a:r>
-          </a:p>
-          <a:p>
-            <a:pPr marL="0" indent="0">
-              <a:buNone/>
-            </a:pPr>
+              <a:rPr lang="en-US" sz="2900" dirty="0"/>
+              <a:t>Exceptionally complete documentation (</a:t>
+            </a:r>
+            <a:r>
+              <a:rPr lang="en-US" sz="2900" dirty="0">
+                <a:hlinkClick r:id="rId2"/>
+              </a:rPr>
+              <a:t>https://mspass.org</a:t>
+            </a:r>
+            <a:r>
+              <a:rPr lang="en-US" sz="2900" dirty="0"/>
+              <a:t> ) for open-source package</a:t>
+            </a:r>
+          </a:p>
+          <a:p>
+            <a:r>
+              <a:rPr lang="en-US" sz="2900" dirty="0"/>
+              <a:t>Database to manage large data sets</a:t>
+            </a:r>
+          </a:p>
+          <a:p>
+            <a:r>
+              <a:rPr lang="en-US" sz="2900" dirty="0"/>
+              <a:t>Parallel processing</a:t>
+            </a:r>
+          </a:p>
+          <a:p>
+            <a:pPr lvl="1"/>
+            <a:r>
+              <a:rPr lang="en-US" sz="2500" dirty="0"/>
+              <a:t>HPC or cloud functionality</a:t>
+            </a:r>
+          </a:p>
+          <a:p>
+            <a:pPr lvl="1"/>
+            <a:r>
+              <a:rPr lang="en-US" sz="2500" dirty="0"/>
+              <a:t>Clean error handling for long running jobs</a:t>
+            </a:r>
+          </a:p>
+          <a:p>
+            <a:r>
+              <a:rPr lang="en-US" sz="2900" dirty="0"/>
+              <a:t>Flexible but simple  to use IO abstractions (read-write almost any format and from URL)</a:t>
+            </a:r>
+          </a:p>
+          <a:p>
+            <a:r>
+              <a:rPr lang="en-US" sz="2900" dirty="0"/>
+              <a:t>Python job control language</a:t>
+            </a:r>
+          </a:p>
+          <a:p>
+            <a:pPr lvl="1"/>
+            <a:r>
+              <a:rPr lang="en-US" sz="2500" dirty="0"/>
+              <a:t>Reproducibility automatic if you submit </a:t>
+            </a:r>
+            <a:r>
+              <a:rPr lang="en-US" sz="2500" dirty="0" err="1"/>
+              <a:t>jupyter</a:t>
+            </a:r>
+            <a:r>
+              <a:rPr lang="en-US" sz="2500" dirty="0"/>
+              <a:t> notebook with your paper</a:t>
+            </a:r>
+          </a:p>
+          <a:p>
+            <a:r>
+              <a:rPr lang="en-US" sz="2900" dirty="0"/>
+              <a:t>Algorithms – low level preprocessing (solved problem) focus</a:t>
+            </a:r>
+          </a:p>
+          <a:p>
+            <a:pPr lvl="1"/>
+            <a:r>
+              <a:rPr lang="en-US" sz="2500" dirty="0"/>
+              <a:t>All </a:t>
+            </a:r>
+            <a:r>
+              <a:rPr lang="en-US" sz="2500" dirty="0" err="1"/>
+              <a:t>obspy</a:t>
+            </a:r>
+            <a:r>
+              <a:rPr lang="en-US" sz="2500" dirty="0"/>
+              <a:t> signal processing algorithms</a:t>
+            </a:r>
+          </a:p>
+          <a:p>
+            <a:pPr lvl="1"/>
+            <a:r>
+              <a:rPr lang="en-US" sz="2500" dirty="0"/>
+              <a:t>Low-level windowing, bundling, and similar grungy stuff</a:t>
+            </a:r>
+          </a:p>
+          <a:p>
+            <a:pPr lvl="1"/>
+            <a:r>
+              <a:rPr lang="en-US" sz="2500" dirty="0"/>
+              <a:t>Three-component primitives (rotation and transformation)</a:t>
+            </a:r>
+          </a:p>
+          <a:p>
+            <a:pPr lvl="1"/>
+            <a:r>
+              <a:rPr lang="en-US" sz="2500" dirty="0"/>
+              <a:t>Trace </a:t>
+            </a:r>
+            <a:r>
+              <a:rPr lang="en-US" sz="2500" dirty="0" err="1"/>
+              <a:t>editng</a:t>
+            </a:r>
+            <a:endParaRPr lang="en-US" sz="2500" dirty="0"/>
+          </a:p>
+          <a:p>
+            <a:pPr lvl="1"/>
+            <a:r>
+              <a:rPr lang="en-US" sz="2500" dirty="0"/>
+              <a:t>Header math</a:t>
+            </a:r>
+          </a:p>
+          <a:p>
+            <a:pPr lvl="1"/>
+            <a:r>
+              <a:rPr lang="en-US" sz="2500" dirty="0"/>
+              <a:t>SNR calculations </a:t>
+            </a:r>
+          </a:p>
+          <a:p>
+            <a:pPr lvl="1"/>
+            <a:r>
+              <a:rPr lang="en-US" sz="2500" dirty="0"/>
+              <a:t>All common P receiver function  </a:t>
+            </a:r>
+            <a:r>
+              <a:rPr lang="en-US" sz="2500" dirty="0" err="1"/>
+              <a:t>deconvolution+novel</a:t>
+            </a:r>
+            <a:r>
+              <a:rPr lang="en-US" sz="2500" dirty="0"/>
+              <a:t> new method</a:t>
+            </a:r>
+          </a:p>
+          <a:p>
+            <a:r>
+              <a:rPr lang="en-US" sz="2900" dirty="0"/>
+              <a:t>Docker container or anaconda package distribution</a:t>
+            </a:r>
+          </a:p>
+          <a:p>
             <a:endParaRPr lang="en-US" dirty="0"/>
           </a:p>
           <a:p>
@@ -13423,7 +13279,7 @@
     </p:spTree>
     <p:extLst>
       <p:ext uri="{BB962C8B-B14F-4D97-AF65-F5344CB8AC3E}">
-        <p14:creationId xmlns:p14="http://schemas.microsoft.com/office/powerpoint/2010/main" val="2150443537"/>
+        <p14:creationId xmlns:p14="http://schemas.microsoft.com/office/powerpoint/2010/main" val="472050597"/>
       </p:ext>
     </p:extLst>
   </p:cSld>
@@ -13455,7 +13311,7 @@
           <p:cNvPr id="2" name="Title 1">
             <a:extLst>
               <a:ext uri="{FF2B5EF4-FFF2-40B4-BE49-F238E27FC236}">
-                <a16:creationId xmlns:a16="http://schemas.microsoft.com/office/drawing/2014/main" id="{C3AFD8F0-BD51-A8EA-F65A-4D5B1C5F66AB}"/>
+                <a16:creationId xmlns:a16="http://schemas.microsoft.com/office/drawing/2014/main" id="{25C07852-A7DD-2E70-1862-76FE73ACAA68}"/>
               </a:ext>
             </a:extLst>
           </p:cNvPr>
@@ -13473,7 +13329,7 @@
           <a:p>
             <a:r>
               <a:rPr lang="en-US" dirty="0"/>
-              <a:t>Documentation, documentation, documentation:</a:t>
+              <a:t>Sermonette/Sales Pitch</a:t>
             </a:r>
           </a:p>
         </p:txBody>
@@ -13483,7 +13339,7 @@
           <p:cNvPr id="3" name="Content Placeholder 2">
             <a:extLst>
               <a:ext uri="{FF2B5EF4-FFF2-40B4-BE49-F238E27FC236}">
-                <a16:creationId xmlns:a16="http://schemas.microsoft.com/office/drawing/2014/main" id="{7E6F0343-D89A-293A-ECC8-AC8BEA66DFFD}"/>
+                <a16:creationId xmlns:a16="http://schemas.microsoft.com/office/drawing/2014/main" id="{40F2B149-0D77-D08B-DB15-456B2B3ECB78}"/>
               </a:ext>
             </a:extLst>
           </p:cNvPr>
@@ -13500,49 +13356,109 @@
           <a:lstStyle/>
           <a:p>
             <a:r>
-              <a:rPr lang="en-US" dirty="0">
-                <a:hlinkClick r:id="rId2"/>
-              </a:rPr>
-              <a:t>User Manual</a:t>
+              <a:rPr lang="en-US" dirty="0"/>
+              <a:t>This community needs to recognize what we have given you</a:t>
+            </a:r>
+          </a:p>
+          <a:p>
+            <a:r>
+              <a:rPr lang="en-US" dirty="0" err="1"/>
+              <a:t>MsPASS</a:t>
+            </a:r>
+            <a:r>
+              <a:rPr lang="en-US" dirty="0"/>
+              <a:t> makes archaic</a:t>
+            </a:r>
+          </a:p>
+          <a:p>
+            <a:pPr lvl="1"/>
+            <a:r>
+              <a:rPr lang="en-US" dirty="0"/>
+              <a:t>SAC</a:t>
+            </a:r>
+          </a:p>
+          <a:p>
+            <a:pPr lvl="1"/>
+            <a:r>
+              <a:rPr lang="en-US" dirty="0"/>
+              <a:t>AH</a:t>
+            </a:r>
+          </a:p>
+          <a:p>
+            <a:pPr lvl="1"/>
+            <a:r>
+              <a:rPr lang="en-US" dirty="0"/>
+              <a:t>Most, if not all, existing generic waveform handling tools</a:t>
+            </a:r>
+          </a:p>
+          <a:p>
+            <a:r>
+              <a:rPr lang="en-US" dirty="0" err="1"/>
+              <a:t>MsPASS</a:t>
+            </a:r>
+            <a:r>
+              <a:rPr lang="en-US" dirty="0"/>
+              <a:t> </a:t>
+            </a:r>
+            <a:r>
+              <a:rPr lang="en-US" dirty="0" err="1"/>
+              <a:t>supercedes</a:t>
+            </a:r>
+            <a:r>
+              <a:rPr lang="en-US" dirty="0"/>
+              <a:t> </a:t>
+            </a:r>
+            <a:r>
+              <a:rPr lang="en-US" dirty="0" err="1"/>
+              <a:t>ObsPy</a:t>
             </a:r>
             <a:endParaRPr lang="en-US" dirty="0"/>
           </a:p>
           <a:p>
-            <a:r>
-              <a:rPr lang="en-US" dirty="0">
-                <a:hlinkClick r:id="rId3"/>
-              </a:rPr>
-              <a:t>Python API Reference</a:t>
+            <a:pPr lvl="1"/>
+            <a:r>
+              <a:rPr lang="en-US" dirty="0"/>
+              <a:t>If you use </a:t>
+            </a:r>
+            <a:r>
+              <a:rPr lang="en-US" dirty="0" err="1"/>
+              <a:t>ObsPy</a:t>
+            </a:r>
+            <a:r>
+              <a:rPr lang="en-US" dirty="0"/>
+              <a:t> you can use </a:t>
+            </a:r>
+            <a:r>
+              <a:rPr lang="en-US" dirty="0" err="1"/>
+              <a:t>MsPASS</a:t>
+            </a:r>
+            <a:r>
+              <a:rPr lang="en-US" dirty="0"/>
+              <a:t> with minimal effort</a:t>
+            </a:r>
+          </a:p>
+          <a:p>
+            <a:pPr lvl="1"/>
+            <a:r>
+              <a:rPr lang="en-US" dirty="0"/>
+              <a:t>Drastically increases functionality over </a:t>
+            </a:r>
+            <a:r>
+              <a:rPr lang="en-US" dirty="0" err="1"/>
+              <a:t>ObsPy</a:t>
             </a:r>
             <a:endParaRPr lang="en-US" dirty="0"/>
           </a:p>
           <a:p>
-            <a:r>
-              <a:rPr lang="en-US" dirty="0">
-                <a:hlinkClick r:id="rId4"/>
-              </a:rPr>
-              <a:t>C++ API</a:t>
-            </a:r>
+            <a:pPr lvl="1"/>
             <a:endParaRPr lang="en-US" dirty="0"/>
-          </a:p>
-          <a:p>
-            <a:r>
-              <a:rPr lang="en-US" dirty="0">
-                <a:hlinkClick r:id="rId5"/>
-              </a:rPr>
-              <a:t>Tutorials</a:t>
-            </a:r>
-            <a:r>
-              <a:rPr lang="en-US" dirty="0"/>
-              <a:t> – you all should have cloned this repository already</a:t>
-            </a:r>
           </a:p>
         </p:txBody>
       </p:sp>
     </p:spTree>
     <p:extLst>
       <p:ext uri="{BB962C8B-B14F-4D97-AF65-F5344CB8AC3E}">
-        <p14:creationId xmlns:p14="http://schemas.microsoft.com/office/powerpoint/2010/main" val="3366715822"/>
+        <p14:creationId xmlns:p14="http://schemas.microsoft.com/office/powerpoint/2010/main" val="2540436878"/>
       </p:ext>
     </p:extLst>
   </p:cSld>

</xml_diff>